<commit_message>
Se arreglo afecto de imagenes
</commit_message>
<xml_diff>
--- a/extras/docs/rdc_presentacion.pptx
+++ b/extras/docs/rdc_presentacion.pptx
@@ -127,7 +127,7 @@
   </p:defaultTextStyle>
   <p:extLst>
     <p:ext uri="{EFAFB233-063F-42B5-8137-9DF3F51BA10A}">
-      <p15:sldGuideLst xmlns:p15="http://schemas.microsoft.com/office/powerpoint/2012/main">
+      <p15:sldGuideLst xmlns:p15="http://schemas.microsoft.com/office/powerpoint/2012/main" xmlns="">
         <p15:guide id="1" orient="horz" pos="2160">
           <p15:clr>
             <a:srgbClr val="A4A3A4"/>
@@ -149,9 +149,9 @@
 </file>
 
 <file path=ppt/charts/chart1.xml><?xml version="1.0" encoding="utf-8"?>
-<c:chartSpace xmlns:c="http://schemas.openxmlformats.org/drawingml/2006/chart" xmlns:a="http://schemas.openxmlformats.org/drawingml/2006/main" xmlns:r="http://schemas.openxmlformats.org/officeDocument/2006/relationships" xmlns:c16r2="http://schemas.microsoft.com/office/drawing/2015/06/chart">
+<c:chartSpace xmlns:c="http://schemas.openxmlformats.org/drawingml/2006/chart" xmlns:a="http://schemas.openxmlformats.org/drawingml/2006/main" xmlns:r="http://schemas.openxmlformats.org/officeDocument/2006/relationships">
   <c:date1904 val="0"/>
-  <c:lang val="es-ES"/>
+  <c:lang val="es-CO"/>
   <c:roundedCorners val="1"/>
   <mc:AlternateContent xmlns:mc="http://schemas.openxmlformats.org/markup-compatibility/2006">
     <mc:Choice xmlns:c14="http://schemas.microsoft.com/office/drawing/2007/8/2/chart" Requires="c14">
@@ -165,27 +165,14 @@
     <c:title>
       <c:tx>
         <c:rich>
-          <a:bodyPr rot="0" spcFirstLastPara="1" vertOverflow="ellipsis" vert="horz" wrap="square" anchor="ctr" anchorCtr="1"/>
+          <a:bodyPr rot="0" vert="horz"/>
           <a:lstStyle/>
           <a:p>
             <a:pPr>
-              <a:defRPr sz="1400" b="1" i="0" u="none" strike="noStrike" kern="1200" baseline="0">
-                <a:solidFill>
-                  <a:schemeClr val="tx1">
-                    <a:lumMod val="65000"/>
-                    <a:lumOff val="35000"/>
-                  </a:schemeClr>
-                </a:solidFill>
-                <a:latin typeface="Arial" panose="020B0604020202020204" pitchFamily="34" charset="0"/>
-                <a:ea typeface="+mn-ea"/>
-                <a:cs typeface="Arial" panose="020B0604020202020204" pitchFamily="34" charset="0"/>
-              </a:defRPr>
+              <a:defRPr/>
             </a:pPr>
             <a:r>
-              <a:rPr lang="es-CO" sz="1400">
-                <a:latin typeface="Arial" panose="020B0604020202020204" pitchFamily="34" charset="0"/>
-                <a:cs typeface="Arial" panose="020B0604020202020204" pitchFamily="34" charset="0"/>
-              </a:rPr>
+              <a:rPr lang="es-CO"/>
               <a:t>Carga Parcial por Secciones</a:t>
             </a:r>
           </a:p>
@@ -195,8 +182,8 @@
         <c:manualLayout>
           <c:xMode val="edge"/>
           <c:yMode val="edge"/>
-          <c:x val="0.21331406040047235"/>
-          <c:y val="5.3718508669864162E-2"/>
+          <c:x val="0.33084892708765218"/>
+          <c:y val="5.3718370319650696E-2"/>
         </c:manualLayout>
       </c:layout>
       <c:overlay val="0"/>
@@ -207,26 +194,6 @@
         </a:ln>
         <a:effectLst/>
       </c:spPr>
-      <c:txPr>
-        <a:bodyPr rot="0" spcFirstLastPara="1" vertOverflow="ellipsis" vert="horz" wrap="square" anchor="ctr" anchorCtr="1"/>
-        <a:lstStyle/>
-        <a:p>
-          <a:pPr>
-            <a:defRPr sz="1400" b="1" i="0" u="none" strike="noStrike" kern="1200" baseline="0">
-              <a:solidFill>
-                <a:schemeClr val="tx1">
-                  <a:lumMod val="65000"/>
-                  <a:lumOff val="35000"/>
-                </a:schemeClr>
-              </a:solidFill>
-              <a:latin typeface="Arial" panose="020B0604020202020204" pitchFamily="34" charset="0"/>
-              <a:ea typeface="+mn-ea"/>
-              <a:cs typeface="Arial" panose="020B0604020202020204" pitchFamily="34" charset="0"/>
-            </a:defRPr>
-          </a:pPr>
-          <a:endParaRPr lang="es-CO"/>
-        </a:p>
-      </c:txPr>
     </c:title>
     <c:autoTitleDeleted val="0"/>
     <c:plotArea>
@@ -363,7 +330,7 @@
               </c:numCache>
             </c:numRef>
           </c:val>
-          <c:extLst>
+          <c:extLst xmlns:c16r2="http://schemas.microsoft.com/office/drawing/2015/06/chart">
             <c:ext xmlns:c16="http://schemas.microsoft.com/office/drawing/2014/chart" uri="{C3380CC4-5D6E-409C-BE32-E72D297353CC}">
               <c16:uniqueId val="{00000000-D21C-4448-B589-C66B95183857}"/>
             </c:ext>
@@ -497,7 +464,7 @@
               </c:numCache>
             </c:numRef>
           </c:val>
-          <c:extLst>
+          <c:extLst xmlns:c16r2="http://schemas.microsoft.com/office/drawing/2015/06/chart">
             <c:ext xmlns:c16="http://schemas.microsoft.com/office/drawing/2014/chart" uri="{C3380CC4-5D6E-409C-BE32-E72D297353CC}">
               <c16:uniqueId val="{00000001-D21C-4448-B589-C66B95183857}"/>
             </c:ext>
@@ -513,11 +480,11 @@
         </c:dLbls>
         <c:gapWidth val="100"/>
         <c:overlap val="-24"/>
-        <c:axId val="212121472"/>
-        <c:axId val="248918400"/>
+        <c:axId val="156258688"/>
+        <c:axId val="156260608"/>
       </c:barChart>
       <c:catAx>
-        <c:axId val="212121472"/>
+        <c:axId val="156258688"/>
         <c:scaling>
           <c:orientation val="minMax"/>
         </c:scaling>
@@ -526,32 +493,20 @@
         <c:title>
           <c:tx>
             <c:rich>
-              <a:bodyPr rot="0" spcFirstLastPara="1" vertOverflow="ellipsis" vert="horz" wrap="square" anchor="ctr" anchorCtr="1"/>
+              <a:bodyPr rot="0" vert="horz"/>
               <a:lstStyle/>
               <a:p>
                 <a:pPr>
-                  <a:defRPr sz="1197" b="0" i="0" u="none" strike="noStrike" kern="1200" baseline="0">
-                    <a:solidFill>
-                      <a:schemeClr val="tx1">
-                        <a:lumMod val="65000"/>
-                        <a:lumOff val="35000"/>
-                      </a:schemeClr>
-                    </a:solidFill>
-                    <a:latin typeface="Arial" panose="020B0604020202020204" pitchFamily="34" charset="0"/>
-                    <a:ea typeface="+mn-ea"/>
-                    <a:cs typeface="Arial" panose="020B0604020202020204" pitchFamily="34" charset="0"/>
-                  </a:defRPr>
+                  <a:defRPr/>
                 </a:pPr>
                 <a:r>
-                  <a:rPr lang="es-CO">
-                    <a:latin typeface="Arial" panose="020B0604020202020204" pitchFamily="34" charset="0"/>
-                    <a:cs typeface="Arial" panose="020B0604020202020204" pitchFamily="34" charset="0"/>
-                  </a:rPr>
+                  <a:rPr lang="es-CO"/>
                   <a:t>Secciones</a:t>
                 </a:r>
               </a:p>
             </c:rich>
           </c:tx>
+          <c:layout/>
           <c:overlay val="0"/>
           <c:spPr>
             <a:noFill/>
@@ -560,26 +515,6 @@
             </a:ln>
             <a:effectLst/>
           </c:spPr>
-          <c:txPr>
-            <a:bodyPr rot="0" spcFirstLastPara="1" vertOverflow="ellipsis" vert="horz" wrap="square" anchor="ctr" anchorCtr="1"/>
-            <a:lstStyle/>
-            <a:p>
-              <a:pPr>
-                <a:defRPr sz="1197" b="0" i="0" u="none" strike="noStrike" kern="1200" baseline="0">
-                  <a:solidFill>
-                    <a:schemeClr val="tx1">
-                      <a:lumMod val="65000"/>
-                      <a:lumOff val="35000"/>
-                    </a:schemeClr>
-                  </a:solidFill>
-                  <a:latin typeface="Arial" panose="020B0604020202020204" pitchFamily="34" charset="0"/>
-                  <a:ea typeface="+mn-ea"/>
-                  <a:cs typeface="Arial" panose="020B0604020202020204" pitchFamily="34" charset="0"/>
-                </a:defRPr>
-              </a:pPr>
-              <a:endParaRPr lang="es-CO"/>
-            </a:p>
-          </c:txPr>
         </c:title>
         <c:numFmt formatCode="General" sourceLinked="0"/>
         <c:majorTickMark val="none"/>
@@ -599,26 +534,16 @@
           <a:effectLst/>
         </c:spPr>
         <c:txPr>
-          <a:bodyPr rot="-60000000" spcFirstLastPara="1" vertOverflow="ellipsis" vert="horz" wrap="square" anchor="ctr" anchorCtr="1"/>
+          <a:bodyPr rot="-60000000" vert="horz"/>
           <a:lstStyle/>
           <a:p>
             <a:pPr>
-              <a:defRPr sz="1197" b="0" i="0" u="none" strike="noStrike" kern="1200" baseline="0">
-                <a:solidFill>
-                  <a:schemeClr val="tx1">
-                    <a:lumMod val="65000"/>
-                    <a:lumOff val="35000"/>
-                  </a:schemeClr>
-                </a:solidFill>
-                <a:latin typeface="Arial" panose="020B0604020202020204" pitchFamily="34" charset="0"/>
-                <a:ea typeface="+mn-ea"/>
-                <a:cs typeface="Arial" panose="020B0604020202020204" pitchFamily="34" charset="0"/>
-              </a:defRPr>
+              <a:defRPr/>
             </a:pPr>
             <a:endParaRPr lang="es-CO"/>
           </a:p>
         </c:txPr>
-        <c:crossAx val="248918400"/>
+        <c:crossAx val="156260608"/>
         <c:crosses val="autoZero"/>
         <c:auto val="1"/>
         <c:lblAlgn val="ctr"/>
@@ -626,7 +551,7 @@
         <c:noMultiLvlLbl val="1"/>
       </c:catAx>
       <c:valAx>
-        <c:axId val="248918400"/>
+        <c:axId val="156260608"/>
         <c:scaling>
           <c:orientation val="minMax"/>
         </c:scaling>
@@ -649,32 +574,20 @@
         <c:title>
           <c:tx>
             <c:rich>
-              <a:bodyPr rot="-5400000" spcFirstLastPara="1" vertOverflow="ellipsis" vert="horz" wrap="square" anchor="ctr" anchorCtr="1"/>
+              <a:bodyPr rot="-5400000" vert="horz"/>
               <a:lstStyle/>
               <a:p>
                 <a:pPr>
-                  <a:defRPr sz="1197" b="0" i="0" u="none" strike="noStrike" kern="1200" baseline="0">
-                    <a:solidFill>
-                      <a:schemeClr val="tx1">
-                        <a:lumMod val="65000"/>
-                        <a:lumOff val="35000"/>
-                      </a:schemeClr>
-                    </a:solidFill>
-                    <a:latin typeface="Arial" panose="020B0604020202020204" pitchFamily="34" charset="0"/>
-                    <a:ea typeface="+mn-ea"/>
-                    <a:cs typeface="Arial" panose="020B0604020202020204" pitchFamily="34" charset="0"/>
-                  </a:defRPr>
+                  <a:defRPr/>
                 </a:pPr>
                 <a:r>
-                  <a:rPr lang="es-CO">
-                    <a:latin typeface="Arial" panose="020B0604020202020204" pitchFamily="34" charset="0"/>
-                    <a:cs typeface="Arial" panose="020B0604020202020204" pitchFamily="34" charset="0"/>
-                  </a:rPr>
+                  <a:rPr lang="es-CO"/>
                   <a:t>Tiempo de Carga (seg)</a:t>
                 </a:r>
               </a:p>
             </c:rich>
           </c:tx>
+          <c:layout/>
           <c:overlay val="0"/>
           <c:spPr>
             <a:noFill/>
@@ -683,26 +596,6 @@
             </a:ln>
             <a:effectLst/>
           </c:spPr>
-          <c:txPr>
-            <a:bodyPr rot="-5400000" spcFirstLastPara="1" vertOverflow="ellipsis" vert="horz" wrap="square" anchor="ctr" anchorCtr="1"/>
-            <a:lstStyle/>
-            <a:p>
-              <a:pPr>
-                <a:defRPr sz="1197" b="0" i="0" u="none" strike="noStrike" kern="1200" baseline="0">
-                  <a:solidFill>
-                    <a:schemeClr val="tx1">
-                      <a:lumMod val="65000"/>
-                      <a:lumOff val="35000"/>
-                    </a:schemeClr>
-                  </a:solidFill>
-                  <a:latin typeface="Arial" panose="020B0604020202020204" pitchFamily="34" charset="0"/>
-                  <a:ea typeface="+mn-ea"/>
-                  <a:cs typeface="Arial" panose="020B0604020202020204" pitchFamily="34" charset="0"/>
-                </a:defRPr>
-              </a:pPr>
-              <a:endParaRPr lang="es-CO"/>
-            </a:p>
-          </c:txPr>
         </c:title>
         <c:numFmt formatCode="General" sourceLinked="1"/>
         <c:majorTickMark val="none"/>
@@ -716,26 +609,16 @@
           <a:effectLst/>
         </c:spPr>
         <c:txPr>
-          <a:bodyPr rot="-60000000" spcFirstLastPara="1" vertOverflow="ellipsis" vert="horz" wrap="square" anchor="ctr" anchorCtr="1"/>
+          <a:bodyPr rot="-60000000" vert="horz"/>
           <a:lstStyle/>
           <a:p>
             <a:pPr>
-              <a:defRPr sz="1197" b="0" i="0" u="none" strike="noStrike" kern="1200" baseline="0">
-                <a:solidFill>
-                  <a:schemeClr val="tx1">
-                    <a:lumMod val="65000"/>
-                    <a:lumOff val="35000"/>
-                  </a:schemeClr>
-                </a:solidFill>
-                <a:latin typeface="+mn-lt"/>
-                <a:ea typeface="+mn-ea"/>
-                <a:cs typeface="+mn-cs"/>
-              </a:defRPr>
+              <a:defRPr/>
             </a:pPr>
             <a:endParaRPr lang="es-CO"/>
           </a:p>
         </c:txPr>
-        <c:crossAx val="212121472"/>
+        <c:crossAx val="156258688"/>
         <c:crosses val="autoZero"/>
         <c:crossBetween val="between"/>
       </c:valAx>
@@ -749,6 +632,7 @@
     </c:plotArea>
     <c:legend>
       <c:legendPos val="b"/>
+      <c:layout/>
       <c:overlay val="0"/>
       <c:spPr>
         <a:noFill/>
@@ -758,21 +642,11 @@
         <a:effectLst/>
       </c:spPr>
       <c:txPr>
-        <a:bodyPr rot="0" spcFirstLastPara="1" vertOverflow="ellipsis" vert="horz" wrap="square" anchor="ctr" anchorCtr="1"/>
+        <a:bodyPr rot="0" vert="horz"/>
         <a:lstStyle/>
         <a:p>
           <a:pPr>
-            <a:defRPr sz="1197" b="0" i="0" u="none" strike="noStrike" kern="1200" baseline="0">
-              <a:solidFill>
-                <a:schemeClr val="tx1">
-                  <a:lumMod val="65000"/>
-                  <a:lumOff val="35000"/>
-                </a:schemeClr>
-              </a:solidFill>
-              <a:latin typeface="Arial" panose="020B0604020202020204" pitchFamily="34" charset="0"/>
-              <a:ea typeface="+mn-ea"/>
-              <a:cs typeface="Arial" panose="020B0604020202020204" pitchFamily="34" charset="0"/>
-            </a:defRPr>
+            <a:defRPr/>
           </a:pPr>
           <a:endParaRPr lang="es-CO"/>
         </a:p>
@@ -783,9 +657,14 @@
     <c:showDLblsOverMax val="1"/>
   </c:chart>
   <c:spPr>
-    <a:noFill/>
-    <a:ln>
-      <a:noFill/>
+    <a:solidFill>
+      <a:schemeClr val="lt1"/>
+    </a:solidFill>
+    <a:ln w="19050" cap="rnd" cmpd="sng" algn="ctr">
+      <a:solidFill>
+        <a:schemeClr val="dk1"/>
+      </a:solidFill>
+      <a:prstDash val="solid"/>
     </a:ln>
     <a:effectLst/>
   </c:spPr>
@@ -794,21 +673,28 @@
     <a:lstStyle/>
     <a:p>
       <a:pPr>
-        <a:defRPr/>
+        <a:defRPr>
+          <a:solidFill>
+            <a:schemeClr val="dk1"/>
+          </a:solidFill>
+          <a:latin typeface="+mn-lt"/>
+          <a:ea typeface="+mn-ea"/>
+          <a:cs typeface="+mn-cs"/>
+        </a:defRPr>
       </a:pPr>
       <a:endParaRPr lang="es-CO"/>
     </a:p>
   </c:txPr>
-  <c:externalData r:id="rId3">
+  <c:externalData r:id="rId1">
     <c:autoUpdate val="0"/>
   </c:externalData>
 </c:chartSpace>
 </file>
 
 <file path=ppt/charts/chart2.xml><?xml version="1.0" encoding="utf-8"?>
-<c:chartSpace xmlns:c="http://schemas.openxmlformats.org/drawingml/2006/chart" xmlns:a="http://schemas.openxmlformats.org/drawingml/2006/main" xmlns:r="http://schemas.openxmlformats.org/officeDocument/2006/relationships" xmlns:c16r2="http://schemas.microsoft.com/office/drawing/2015/06/chart">
+<c:chartSpace xmlns:c="http://schemas.openxmlformats.org/drawingml/2006/chart" xmlns:a="http://schemas.openxmlformats.org/drawingml/2006/main" xmlns:r="http://schemas.openxmlformats.org/officeDocument/2006/relationships">
   <c:date1904 val="0"/>
-  <c:lang val="es-ES"/>
+  <c:lang val="es-CO"/>
   <c:roundedCorners val="1"/>
   <mc:AlternateContent xmlns:mc="http://schemas.openxmlformats.org/markup-compatibility/2006">
     <mc:Choice xmlns:c14="http://schemas.microsoft.com/office/drawing/2007/8/2/chart" Requires="c14">
@@ -822,27 +708,14 @@
     <c:title>
       <c:tx>
         <c:rich>
-          <a:bodyPr rot="0" spcFirstLastPara="1" vertOverflow="ellipsis" vert="horz" wrap="square" anchor="ctr" anchorCtr="1"/>
+          <a:bodyPr rot="0" vert="horz"/>
           <a:lstStyle/>
           <a:p>
             <a:pPr>
-              <a:defRPr sz="1600" b="1" i="0" u="none" strike="noStrike" kern="1200" baseline="0">
-                <a:solidFill>
-                  <a:schemeClr val="tx1">
-                    <a:lumMod val="65000"/>
-                    <a:lumOff val="35000"/>
-                  </a:schemeClr>
-                </a:solidFill>
-                <a:latin typeface="Arial" panose="020B0604020202020204" pitchFamily="34" charset="0"/>
-                <a:ea typeface="+mn-ea"/>
-                <a:cs typeface="Arial" panose="020B0604020202020204" pitchFamily="34" charset="0"/>
-              </a:defRPr>
+              <a:defRPr/>
             </a:pPr>
             <a:r>
-              <a:rPr lang="es-CO" sz="1600">
-                <a:latin typeface="Arial" panose="020B0604020202020204" pitchFamily="34" charset="0"/>
-                <a:cs typeface="Arial" panose="020B0604020202020204" pitchFamily="34" charset="0"/>
-              </a:rPr>
+              <a:rPr lang="es-CO"/>
               <a:t>Carga Total por Secciones</a:t>
             </a:r>
           </a:p>
@@ -852,8 +725,8 @@
         <c:manualLayout>
           <c:xMode val="edge"/>
           <c:yMode val="edge"/>
-          <c:x val="0.13507725194144546"/>
-          <c:y val="2.291812724613437E-2"/>
+          <c:x val="0.34513906461109811"/>
+          <c:y val="2.2917960633855112E-2"/>
         </c:manualLayout>
       </c:layout>
       <c:overlay val="0"/>
@@ -864,26 +737,6 @@
         </a:ln>
         <a:effectLst/>
       </c:spPr>
-      <c:txPr>
-        <a:bodyPr rot="0" spcFirstLastPara="1" vertOverflow="ellipsis" vert="horz" wrap="square" anchor="ctr" anchorCtr="1"/>
-        <a:lstStyle/>
-        <a:p>
-          <a:pPr>
-            <a:defRPr sz="1600" b="1" i="0" u="none" strike="noStrike" kern="1200" baseline="0">
-              <a:solidFill>
-                <a:schemeClr val="tx1">
-                  <a:lumMod val="65000"/>
-                  <a:lumOff val="35000"/>
-                </a:schemeClr>
-              </a:solidFill>
-              <a:latin typeface="Arial" panose="020B0604020202020204" pitchFamily="34" charset="0"/>
-              <a:ea typeface="+mn-ea"/>
-              <a:cs typeface="Arial" panose="020B0604020202020204" pitchFamily="34" charset="0"/>
-            </a:defRPr>
-          </a:pPr>
-          <a:endParaRPr lang="es-CO"/>
-        </a:p>
-      </c:txPr>
     </c:title>
     <c:autoTitleDeleted val="0"/>
     <c:plotArea>
@@ -1020,7 +873,7 @@
               </c:numCache>
             </c:numRef>
           </c:val>
-          <c:extLst>
+          <c:extLst xmlns:c16r2="http://schemas.microsoft.com/office/drawing/2015/06/chart">
             <c:ext xmlns:c16="http://schemas.microsoft.com/office/drawing/2014/chart" uri="{C3380CC4-5D6E-409C-BE32-E72D297353CC}">
               <c16:uniqueId val="{00000000-2D3E-4372-A754-D42F52A5145C}"/>
             </c:ext>
@@ -1154,7 +1007,7 @@
               </c:numCache>
             </c:numRef>
           </c:val>
-          <c:extLst>
+          <c:extLst xmlns:c16r2="http://schemas.microsoft.com/office/drawing/2015/06/chart">
             <c:ext xmlns:c16="http://schemas.microsoft.com/office/drawing/2014/chart" uri="{C3380CC4-5D6E-409C-BE32-E72D297353CC}">
               <c16:uniqueId val="{00000001-2D3E-4372-A754-D42F52A5145C}"/>
             </c:ext>
@@ -1170,11 +1023,11 @@
         </c:dLbls>
         <c:gapWidth val="100"/>
         <c:overlap val="-24"/>
-        <c:axId val="50288128"/>
-        <c:axId val="50289664"/>
+        <c:axId val="156119424"/>
+        <c:axId val="156121344"/>
       </c:barChart>
       <c:catAx>
-        <c:axId val="50288128"/>
+        <c:axId val="156119424"/>
         <c:scaling>
           <c:orientation val="minMax"/>
         </c:scaling>
@@ -1183,32 +1036,20 @@
         <c:title>
           <c:tx>
             <c:rich>
-              <a:bodyPr rot="0" spcFirstLastPara="1" vertOverflow="ellipsis" vert="horz" wrap="square" anchor="ctr" anchorCtr="1"/>
+              <a:bodyPr rot="0" vert="horz"/>
               <a:lstStyle/>
               <a:p>
                 <a:pPr>
-                  <a:defRPr sz="1197" b="0" i="0" u="none" strike="noStrike" kern="1200" baseline="0">
-                    <a:solidFill>
-                      <a:schemeClr val="tx1">
-                        <a:lumMod val="65000"/>
-                        <a:lumOff val="35000"/>
-                      </a:schemeClr>
-                    </a:solidFill>
-                    <a:latin typeface="Arial" panose="020B0604020202020204" pitchFamily="34" charset="0"/>
-                    <a:ea typeface="+mn-ea"/>
-                    <a:cs typeface="Arial" panose="020B0604020202020204" pitchFamily="34" charset="0"/>
-                  </a:defRPr>
+                  <a:defRPr/>
                 </a:pPr>
                 <a:r>
-                  <a:rPr lang="es-CO">
-                    <a:latin typeface="Arial" panose="020B0604020202020204" pitchFamily="34" charset="0"/>
-                    <a:cs typeface="Arial" panose="020B0604020202020204" pitchFamily="34" charset="0"/>
-                  </a:rPr>
+                  <a:rPr lang="es-CO"/>
                   <a:t>Secciones</a:t>
                 </a:r>
               </a:p>
             </c:rich>
           </c:tx>
+          <c:layout/>
           <c:overlay val="0"/>
           <c:spPr>
             <a:noFill/>
@@ -1217,26 +1058,6 @@
             </a:ln>
             <a:effectLst/>
           </c:spPr>
-          <c:txPr>
-            <a:bodyPr rot="0" spcFirstLastPara="1" vertOverflow="ellipsis" vert="horz" wrap="square" anchor="ctr" anchorCtr="1"/>
-            <a:lstStyle/>
-            <a:p>
-              <a:pPr>
-                <a:defRPr sz="1197" b="0" i="0" u="none" strike="noStrike" kern="1200" baseline="0">
-                  <a:solidFill>
-                    <a:schemeClr val="tx1">
-                      <a:lumMod val="65000"/>
-                      <a:lumOff val="35000"/>
-                    </a:schemeClr>
-                  </a:solidFill>
-                  <a:latin typeface="Arial" panose="020B0604020202020204" pitchFamily="34" charset="0"/>
-                  <a:ea typeface="+mn-ea"/>
-                  <a:cs typeface="Arial" panose="020B0604020202020204" pitchFamily="34" charset="0"/>
-                </a:defRPr>
-              </a:pPr>
-              <a:endParaRPr lang="es-CO"/>
-            </a:p>
-          </c:txPr>
         </c:title>
         <c:numFmt formatCode="General" sourceLinked="0"/>
         <c:majorTickMark val="none"/>
@@ -1256,26 +1077,16 @@
           <a:effectLst/>
         </c:spPr>
         <c:txPr>
-          <a:bodyPr rot="-60000000" spcFirstLastPara="1" vertOverflow="ellipsis" vert="horz" wrap="square" anchor="ctr" anchorCtr="1"/>
+          <a:bodyPr rot="-60000000" vert="horz"/>
           <a:lstStyle/>
           <a:p>
             <a:pPr>
-              <a:defRPr sz="1200" b="0" i="0" u="none" strike="noStrike" kern="1200" baseline="0">
-                <a:solidFill>
-                  <a:schemeClr val="tx1">
-                    <a:lumMod val="65000"/>
-                    <a:lumOff val="35000"/>
-                  </a:schemeClr>
-                </a:solidFill>
-                <a:latin typeface="Arial" panose="020B0604020202020204" pitchFamily="34" charset="0"/>
-                <a:ea typeface="+mn-ea"/>
-                <a:cs typeface="Arial" panose="020B0604020202020204" pitchFamily="34" charset="0"/>
-              </a:defRPr>
+              <a:defRPr/>
             </a:pPr>
             <a:endParaRPr lang="es-CO"/>
           </a:p>
         </c:txPr>
-        <c:crossAx val="50289664"/>
+        <c:crossAx val="156121344"/>
         <c:crosses val="autoZero"/>
         <c:auto val="1"/>
         <c:lblAlgn val="ctr"/>
@@ -1283,7 +1094,7 @@
         <c:noMultiLvlLbl val="1"/>
       </c:catAx>
       <c:valAx>
-        <c:axId val="50289664"/>
+        <c:axId val="156121344"/>
         <c:scaling>
           <c:orientation val="minMax"/>
         </c:scaling>
@@ -1306,32 +1117,20 @@
         <c:title>
           <c:tx>
             <c:rich>
-              <a:bodyPr rot="-5400000" spcFirstLastPara="1" vertOverflow="ellipsis" vert="horz" wrap="square" anchor="ctr" anchorCtr="1"/>
+              <a:bodyPr rot="-5400000" vert="horz"/>
               <a:lstStyle/>
               <a:p>
                 <a:pPr>
-                  <a:defRPr sz="1197" b="0" i="0" u="none" strike="noStrike" kern="1200" baseline="0">
-                    <a:solidFill>
-                      <a:schemeClr val="tx1">
-                        <a:lumMod val="65000"/>
-                        <a:lumOff val="35000"/>
-                      </a:schemeClr>
-                    </a:solidFill>
-                    <a:latin typeface="Arial" panose="020B0604020202020204" pitchFamily="34" charset="0"/>
-                    <a:ea typeface="+mn-ea"/>
-                    <a:cs typeface="Arial" panose="020B0604020202020204" pitchFamily="34" charset="0"/>
-                  </a:defRPr>
+                  <a:defRPr/>
                 </a:pPr>
                 <a:r>
-                  <a:rPr lang="es-CO">
-                    <a:latin typeface="Arial" panose="020B0604020202020204" pitchFamily="34" charset="0"/>
-                    <a:cs typeface="Arial" panose="020B0604020202020204" pitchFamily="34" charset="0"/>
-                  </a:rPr>
+                  <a:rPr lang="es-CO"/>
                   <a:t>Tiempo de Carga (seg)</a:t>
                 </a:r>
               </a:p>
             </c:rich>
           </c:tx>
+          <c:layout/>
           <c:overlay val="0"/>
           <c:spPr>
             <a:noFill/>
@@ -1340,26 +1139,6 @@
             </a:ln>
             <a:effectLst/>
           </c:spPr>
-          <c:txPr>
-            <a:bodyPr rot="-5400000" spcFirstLastPara="1" vertOverflow="ellipsis" vert="horz" wrap="square" anchor="ctr" anchorCtr="1"/>
-            <a:lstStyle/>
-            <a:p>
-              <a:pPr>
-                <a:defRPr sz="1197" b="0" i="0" u="none" strike="noStrike" kern="1200" baseline="0">
-                  <a:solidFill>
-                    <a:schemeClr val="tx1">
-                      <a:lumMod val="65000"/>
-                      <a:lumOff val="35000"/>
-                    </a:schemeClr>
-                  </a:solidFill>
-                  <a:latin typeface="Arial" panose="020B0604020202020204" pitchFamily="34" charset="0"/>
-                  <a:ea typeface="+mn-ea"/>
-                  <a:cs typeface="Arial" panose="020B0604020202020204" pitchFamily="34" charset="0"/>
-                </a:defRPr>
-              </a:pPr>
-              <a:endParaRPr lang="es-CO"/>
-            </a:p>
-          </c:txPr>
         </c:title>
         <c:numFmt formatCode="0.00" sourceLinked="1"/>
         <c:majorTickMark val="none"/>
@@ -1373,26 +1152,16 @@
           <a:effectLst/>
         </c:spPr>
         <c:txPr>
-          <a:bodyPr rot="-60000000" spcFirstLastPara="1" vertOverflow="ellipsis" vert="horz" wrap="square" anchor="ctr" anchorCtr="1"/>
+          <a:bodyPr rot="-60000000" vert="horz"/>
           <a:lstStyle/>
           <a:p>
             <a:pPr>
-              <a:defRPr sz="1197" b="0" i="0" u="none" strike="noStrike" kern="1200" baseline="0">
-                <a:solidFill>
-                  <a:schemeClr val="tx1">
-                    <a:lumMod val="65000"/>
-                    <a:lumOff val="35000"/>
-                  </a:schemeClr>
-                </a:solidFill>
-                <a:latin typeface="+mn-lt"/>
-                <a:ea typeface="+mn-ea"/>
-                <a:cs typeface="+mn-cs"/>
-              </a:defRPr>
+              <a:defRPr/>
             </a:pPr>
             <a:endParaRPr lang="es-CO"/>
           </a:p>
         </c:txPr>
-        <c:crossAx val="50288128"/>
+        <c:crossAx val="156119424"/>
         <c:crosses val="autoZero"/>
         <c:crossBetween val="between"/>
       </c:valAx>
@@ -1406,6 +1175,7 @@
     </c:plotArea>
     <c:legend>
       <c:legendPos val="b"/>
+      <c:layout/>
       <c:overlay val="0"/>
       <c:spPr>
         <a:noFill/>
@@ -1415,21 +1185,11 @@
         <a:effectLst/>
       </c:spPr>
       <c:txPr>
-        <a:bodyPr rot="0" spcFirstLastPara="1" vertOverflow="ellipsis" vert="horz" wrap="square" anchor="ctr" anchorCtr="1"/>
+        <a:bodyPr rot="0" vert="horz"/>
         <a:lstStyle/>
         <a:p>
           <a:pPr>
-            <a:defRPr sz="1197" b="0" i="0" u="none" strike="noStrike" kern="1200" baseline="0">
-              <a:solidFill>
-                <a:schemeClr val="tx1">
-                  <a:lumMod val="65000"/>
-                  <a:lumOff val="35000"/>
-                </a:schemeClr>
-              </a:solidFill>
-              <a:latin typeface="Arial" panose="020B0604020202020204" pitchFamily="34" charset="0"/>
-              <a:ea typeface="+mn-ea"/>
-              <a:cs typeface="Arial" panose="020B0604020202020204" pitchFamily="34" charset="0"/>
-            </a:defRPr>
+            <a:defRPr/>
           </a:pPr>
           <a:endParaRPr lang="es-CO"/>
         </a:p>
@@ -1440,9 +1200,14 @@
     <c:showDLblsOverMax val="1"/>
   </c:chart>
   <c:spPr>
-    <a:noFill/>
-    <a:ln>
-      <a:noFill/>
+    <a:solidFill>
+      <a:schemeClr val="lt1"/>
+    </a:solidFill>
+    <a:ln w="19050" cap="rnd" cmpd="sng" algn="ctr">
+      <a:solidFill>
+        <a:schemeClr val="dk1"/>
+      </a:solidFill>
+      <a:prstDash val="solid"/>
     </a:ln>
     <a:effectLst/>
   </c:spPr>
@@ -1451,12 +1216,19 @@
     <a:lstStyle/>
     <a:p>
       <a:pPr>
-        <a:defRPr/>
+        <a:defRPr>
+          <a:solidFill>
+            <a:schemeClr val="dk1"/>
+          </a:solidFill>
+          <a:latin typeface="+mn-lt"/>
+          <a:ea typeface="+mn-ea"/>
+          <a:cs typeface="+mn-cs"/>
+        </a:defRPr>
       </a:pPr>
       <a:endParaRPr lang="es-CO"/>
     </a:p>
   </c:txPr>
-  <c:externalData r:id="rId3">
+  <c:externalData r:id="rId1">
     <c:autoUpdate val="0"/>
   </c:externalData>
 </c:chartSpace>
@@ -8723,6 +8495,16 @@
           <a:prstGeom prst="rect">
             <a:avLst/>
           </a:prstGeom>
+          <a:ln>
+            <a:noFill/>
+          </a:ln>
+          <a:effectLst>
+            <a:outerShdw blurRad="292100" dist="139700" dir="2700000" algn="tl" rotWithShape="0">
+              <a:srgbClr val="333333">
+                <a:alpha val="65000"/>
+              </a:srgbClr>
+            </a:outerShdw>
+          </a:effectLst>
         </p:spPr>
       </p:pic>
     </p:spTree>
@@ -8875,6 +8657,16 @@
           <a:prstGeom prst="rect">
             <a:avLst/>
           </a:prstGeom>
+          <a:ln>
+            <a:noFill/>
+          </a:ln>
+          <a:effectLst>
+            <a:outerShdw blurRad="292100" dist="139700" dir="2700000" algn="tl" rotWithShape="0">
+              <a:srgbClr val="333333">
+                <a:alpha val="65000"/>
+              </a:srgbClr>
+            </a:outerShdw>
+          </a:effectLst>
         </p:spPr>
       </p:pic>
       <p:pic>
@@ -8899,6 +8691,16 @@
           <a:prstGeom prst="rect">
             <a:avLst/>
           </a:prstGeom>
+          <a:ln>
+            <a:noFill/>
+          </a:ln>
+          <a:effectLst>
+            <a:outerShdw blurRad="292100" dist="139700" dir="2700000" algn="tl" rotWithShape="0">
+              <a:srgbClr val="333333">
+                <a:alpha val="65000"/>
+              </a:srgbClr>
+            </a:outerShdw>
+          </a:effectLst>
         </p:spPr>
       </p:pic>
       <p:pic>
@@ -8923,6 +8725,16 @@
           <a:prstGeom prst="rect">
             <a:avLst/>
           </a:prstGeom>
+          <a:ln>
+            <a:noFill/>
+          </a:ln>
+          <a:effectLst>
+            <a:outerShdw blurRad="292100" dist="139700" dir="2700000" algn="tl" rotWithShape="0">
+              <a:srgbClr val="333333">
+                <a:alpha val="65000"/>
+              </a:srgbClr>
+            </a:outerShdw>
+          </a:effectLst>
         </p:spPr>
       </p:pic>
     </p:spTree>
@@ -9075,6 +8887,16 @@
           <a:prstGeom prst="rect">
             <a:avLst/>
           </a:prstGeom>
+          <a:ln>
+            <a:noFill/>
+          </a:ln>
+          <a:effectLst>
+            <a:outerShdw blurRad="292100" dist="139700" dir="2700000" algn="tl" rotWithShape="0">
+              <a:srgbClr val="333333">
+                <a:alpha val="65000"/>
+              </a:srgbClr>
+            </a:outerShdw>
+          </a:effectLst>
         </p:spPr>
       </p:pic>
     </p:spTree>
@@ -9112,7 +8934,7 @@
           <p:cNvPr id="2" name="Marcador de contenido 1">
             <a:extLst>
               <a:ext uri="{FF2B5EF4-FFF2-40B4-BE49-F238E27FC236}">
-                <a16:creationId xmlns:a16="http://schemas.microsoft.com/office/drawing/2014/main" id="{BFB8CA3A-775A-4283-B473-CBA3C699E771}"/>
+                <a16:creationId xmlns:a16="http://schemas.microsoft.com/office/drawing/2014/main" xmlns="" id="{BFB8CA3A-775A-4283-B473-CBA3C699E771}"/>
               </a:ext>
             </a:extLst>
           </p:cNvPr>
@@ -9142,14 +8964,14 @@
                 <a:gridCol w="5304444">
                   <a:extLst>
                     <a:ext uri="{9D8B030D-6E8A-4147-A177-3AD203B41FA5}">
-                      <a16:colId xmlns:a16="http://schemas.microsoft.com/office/drawing/2014/main" val="2602485393"/>
+                      <a16:colId xmlns:a16="http://schemas.microsoft.com/office/drawing/2014/main" xmlns="" val="2602485393"/>
                     </a:ext>
                   </a:extLst>
                 </a:gridCol>
                 <a:gridCol w="1728977">
                   <a:extLst>
                     <a:ext uri="{9D8B030D-6E8A-4147-A177-3AD203B41FA5}">
-                      <a16:colId xmlns:a16="http://schemas.microsoft.com/office/drawing/2014/main" val="2786604418"/>
+                      <a16:colId xmlns:a16="http://schemas.microsoft.com/office/drawing/2014/main" xmlns="" val="2786604418"/>
                     </a:ext>
                   </a:extLst>
                 </a:gridCol>
@@ -9237,7 +9059,7 @@
                 </a:tc>
                 <a:extLst>
                   <a:ext uri="{0D108BD9-81ED-4DB2-BD59-A6C34878D82A}">
-                    <a16:rowId xmlns:a16="http://schemas.microsoft.com/office/drawing/2014/main" val="680232555"/>
+                    <a16:rowId xmlns:a16="http://schemas.microsoft.com/office/drawing/2014/main" xmlns="" val="680232555"/>
                   </a:ext>
                 </a:extLst>
               </a:tr>
@@ -9324,7 +9146,7 @@
                 </a:tc>
                 <a:extLst>
                   <a:ext uri="{0D108BD9-81ED-4DB2-BD59-A6C34878D82A}">
-                    <a16:rowId xmlns:a16="http://schemas.microsoft.com/office/drawing/2014/main" val="3577557739"/>
+                    <a16:rowId xmlns:a16="http://schemas.microsoft.com/office/drawing/2014/main" xmlns="" val="3577557739"/>
                   </a:ext>
                 </a:extLst>
               </a:tr>
@@ -9411,7 +9233,7 @@
                 </a:tc>
                 <a:extLst>
                   <a:ext uri="{0D108BD9-81ED-4DB2-BD59-A6C34878D82A}">
-                    <a16:rowId xmlns:a16="http://schemas.microsoft.com/office/drawing/2014/main" val="3154357346"/>
+                    <a16:rowId xmlns:a16="http://schemas.microsoft.com/office/drawing/2014/main" xmlns="" val="3154357346"/>
                   </a:ext>
                 </a:extLst>
               </a:tr>
@@ -9498,7 +9320,7 @@
                 </a:tc>
                 <a:extLst>
                   <a:ext uri="{0D108BD9-81ED-4DB2-BD59-A6C34878D82A}">
-                    <a16:rowId xmlns:a16="http://schemas.microsoft.com/office/drawing/2014/main" val="2015189163"/>
+                    <a16:rowId xmlns:a16="http://schemas.microsoft.com/office/drawing/2014/main" xmlns="" val="2015189163"/>
                   </a:ext>
                 </a:extLst>
               </a:tr>
@@ -9585,7 +9407,7 @@
                 </a:tc>
                 <a:extLst>
                   <a:ext uri="{0D108BD9-81ED-4DB2-BD59-A6C34878D82A}">
-                    <a16:rowId xmlns:a16="http://schemas.microsoft.com/office/drawing/2014/main" val="3033574485"/>
+                    <a16:rowId xmlns:a16="http://schemas.microsoft.com/office/drawing/2014/main" xmlns="" val="3033574485"/>
                   </a:ext>
                 </a:extLst>
               </a:tr>
@@ -9672,7 +9494,7 @@
                 </a:tc>
                 <a:extLst>
                   <a:ext uri="{0D108BD9-81ED-4DB2-BD59-A6C34878D82A}">
-                    <a16:rowId xmlns:a16="http://schemas.microsoft.com/office/drawing/2014/main" val="105546820"/>
+                    <a16:rowId xmlns:a16="http://schemas.microsoft.com/office/drawing/2014/main" xmlns="" val="105546820"/>
                   </a:ext>
                 </a:extLst>
               </a:tr>
@@ -9759,7 +9581,7 @@
                 </a:tc>
                 <a:extLst>
                   <a:ext uri="{0D108BD9-81ED-4DB2-BD59-A6C34878D82A}">
-                    <a16:rowId xmlns:a16="http://schemas.microsoft.com/office/drawing/2014/main" val="1824869552"/>
+                    <a16:rowId xmlns:a16="http://schemas.microsoft.com/office/drawing/2014/main" xmlns="" val="1824869552"/>
                   </a:ext>
                 </a:extLst>
               </a:tr>
@@ -9846,7 +9668,7 @@
                 </a:tc>
                 <a:extLst>
                   <a:ext uri="{0D108BD9-81ED-4DB2-BD59-A6C34878D82A}">
-                    <a16:rowId xmlns:a16="http://schemas.microsoft.com/office/drawing/2014/main" val="3109995033"/>
+                    <a16:rowId xmlns:a16="http://schemas.microsoft.com/office/drawing/2014/main" xmlns="" val="3109995033"/>
                   </a:ext>
                 </a:extLst>
               </a:tr>
@@ -9933,7 +9755,7 @@
                 </a:tc>
                 <a:extLst>
                   <a:ext uri="{0D108BD9-81ED-4DB2-BD59-A6C34878D82A}">
-                    <a16:rowId xmlns:a16="http://schemas.microsoft.com/office/drawing/2014/main" val="3267673382"/>
+                    <a16:rowId xmlns:a16="http://schemas.microsoft.com/office/drawing/2014/main" xmlns="" val="3267673382"/>
                   </a:ext>
                 </a:extLst>
               </a:tr>
@@ -10020,7 +9842,7 @@
                 </a:tc>
                 <a:extLst>
                   <a:ext uri="{0D108BD9-81ED-4DB2-BD59-A6C34878D82A}">
-                    <a16:rowId xmlns:a16="http://schemas.microsoft.com/office/drawing/2014/main" val="1788793914"/>
+                    <a16:rowId xmlns:a16="http://schemas.microsoft.com/office/drawing/2014/main" xmlns="" val="1788793914"/>
                   </a:ext>
                 </a:extLst>
               </a:tr>
@@ -10107,7 +9929,7 @@
                 </a:tc>
                 <a:extLst>
                   <a:ext uri="{0D108BD9-81ED-4DB2-BD59-A6C34878D82A}">
-                    <a16:rowId xmlns:a16="http://schemas.microsoft.com/office/drawing/2014/main" val="758896334"/>
+                    <a16:rowId xmlns:a16="http://schemas.microsoft.com/office/drawing/2014/main" xmlns="" val="758896334"/>
                   </a:ext>
                 </a:extLst>
               </a:tr>
@@ -10194,7 +10016,7 @@
                 </a:tc>
                 <a:extLst>
                   <a:ext uri="{0D108BD9-81ED-4DB2-BD59-A6C34878D82A}">
-                    <a16:rowId xmlns:a16="http://schemas.microsoft.com/office/drawing/2014/main" val="2965732642"/>
+                    <a16:rowId xmlns:a16="http://schemas.microsoft.com/office/drawing/2014/main" xmlns="" val="2965732642"/>
                   </a:ext>
                 </a:extLst>
               </a:tr>
@@ -10281,7 +10103,7 @@
                 </a:tc>
                 <a:extLst>
                   <a:ext uri="{0D108BD9-81ED-4DB2-BD59-A6C34878D82A}">
-                    <a16:rowId xmlns:a16="http://schemas.microsoft.com/office/drawing/2014/main" val="456296594"/>
+                    <a16:rowId xmlns:a16="http://schemas.microsoft.com/office/drawing/2014/main" xmlns="" val="456296594"/>
                   </a:ext>
                 </a:extLst>
               </a:tr>
@@ -10368,7 +10190,7 @@
                 </a:tc>
                 <a:extLst>
                   <a:ext uri="{0D108BD9-81ED-4DB2-BD59-A6C34878D82A}">
-                    <a16:rowId xmlns:a16="http://schemas.microsoft.com/office/drawing/2014/main" val="1809744462"/>
+                    <a16:rowId xmlns:a16="http://schemas.microsoft.com/office/drawing/2014/main" xmlns="" val="1809744462"/>
                   </a:ext>
                 </a:extLst>
               </a:tr>
@@ -10455,7 +10277,7 @@
                 </a:tc>
                 <a:extLst>
                   <a:ext uri="{0D108BD9-81ED-4DB2-BD59-A6C34878D82A}">
-                    <a16:rowId xmlns:a16="http://schemas.microsoft.com/office/drawing/2014/main" val="3437766592"/>
+                    <a16:rowId xmlns:a16="http://schemas.microsoft.com/office/drawing/2014/main" xmlns="" val="3437766592"/>
                   </a:ext>
                 </a:extLst>
               </a:tr>
@@ -10620,7 +10442,7 @@
           <p:cNvPr id="6" name="Marcador de contenido 5">
             <a:extLst>
               <a:ext uri="{FF2B5EF4-FFF2-40B4-BE49-F238E27FC236}">
-                <a16:creationId xmlns:a16="http://schemas.microsoft.com/office/drawing/2014/main" id="{33CC28FB-25F0-4849-B092-1742F3204970}"/>
+                <a16:creationId xmlns:a16="http://schemas.microsoft.com/office/drawing/2014/main" xmlns="" id="{33CC28FB-25F0-4849-B092-1742F3204970}"/>
               </a:ext>
             </a:extLst>
           </p:cNvPr>
@@ -10650,42 +10472,42 @@
                 <a:gridCol w="937437">
                   <a:extLst>
                     <a:ext uri="{9D8B030D-6E8A-4147-A177-3AD203B41FA5}">
-                      <a16:colId xmlns:a16="http://schemas.microsoft.com/office/drawing/2014/main" val="1021433285"/>
+                      <a16:colId xmlns:a16="http://schemas.microsoft.com/office/drawing/2014/main" xmlns="" val="1021433285"/>
                     </a:ext>
                   </a:extLst>
                 </a:gridCol>
                 <a:gridCol w="937437">
                   <a:extLst>
                     <a:ext uri="{9D8B030D-6E8A-4147-A177-3AD203B41FA5}">
-                      <a16:colId xmlns:a16="http://schemas.microsoft.com/office/drawing/2014/main" val="1809417385"/>
+                      <a16:colId xmlns:a16="http://schemas.microsoft.com/office/drawing/2014/main" xmlns="" val="1809417385"/>
                     </a:ext>
                   </a:extLst>
                 </a:gridCol>
                 <a:gridCol w="937437">
                   <a:extLst>
                     <a:ext uri="{9D8B030D-6E8A-4147-A177-3AD203B41FA5}">
-                      <a16:colId xmlns:a16="http://schemas.microsoft.com/office/drawing/2014/main" val="1689638878"/>
+                      <a16:colId xmlns:a16="http://schemas.microsoft.com/office/drawing/2014/main" xmlns="" val="1689638878"/>
                     </a:ext>
                   </a:extLst>
                 </a:gridCol>
                 <a:gridCol w="937437">
                   <a:extLst>
                     <a:ext uri="{9D8B030D-6E8A-4147-A177-3AD203B41FA5}">
-                      <a16:colId xmlns:a16="http://schemas.microsoft.com/office/drawing/2014/main" val="2762686330"/>
+                      <a16:colId xmlns:a16="http://schemas.microsoft.com/office/drawing/2014/main" xmlns="" val="2762686330"/>
                     </a:ext>
                   </a:extLst>
                 </a:gridCol>
                 <a:gridCol w="937437">
                   <a:extLst>
                     <a:ext uri="{9D8B030D-6E8A-4147-A177-3AD203B41FA5}">
-                      <a16:colId xmlns:a16="http://schemas.microsoft.com/office/drawing/2014/main" val="2113957765"/>
+                      <a16:colId xmlns:a16="http://schemas.microsoft.com/office/drawing/2014/main" xmlns="" val="2113957765"/>
                     </a:ext>
                   </a:extLst>
                 </a:gridCol>
                 <a:gridCol w="937437">
                   <a:extLst>
                     <a:ext uri="{9D8B030D-6E8A-4147-A177-3AD203B41FA5}">
-                      <a16:colId xmlns:a16="http://schemas.microsoft.com/office/drawing/2014/main" val="2495045676"/>
+                      <a16:colId xmlns:a16="http://schemas.microsoft.com/office/drawing/2014/main" xmlns="" val="2495045676"/>
                     </a:ext>
                   </a:extLst>
                 </a:gridCol>
@@ -10698,14 +10520,14 @@
                     <a:p>
                       <a:pPr algn="ctr" fontAlgn="ctr"/>
                       <a:r>
-                        <a:rPr lang="es-CO" sz="1200" u="none" strike="noStrike">
+                        <a:rPr lang="es-CO" sz="1200" u="none" strike="noStrike" dirty="0">
                           <a:effectLst/>
                           <a:latin typeface="Arial" panose="020B0604020202020204" pitchFamily="34" charset="0"/>
                           <a:cs typeface="Arial" panose="020B0604020202020204" pitchFamily="34" charset="0"/>
                         </a:rPr>
                         <a:t>Modulo</a:t>
                       </a:r>
-                      <a:endParaRPr lang="es-CO" sz="1200" b="0" i="0" u="none" strike="noStrike">
+                      <a:endParaRPr lang="es-CO" sz="1200" b="0" i="0" u="none" strike="noStrike" dirty="0">
                         <a:solidFill>
                           <a:srgbClr val="000000"/>
                         </a:solidFill>
@@ -10724,14 +10546,14 @@
                     <a:p>
                       <a:pPr algn="ctr" fontAlgn="ctr"/>
                       <a:r>
-                        <a:rPr lang="es-CO" sz="1200" u="none" strike="noStrike">
+                        <a:rPr lang="es-CO" sz="1200" u="none" strike="noStrike" dirty="0" err="1">
                           <a:effectLst/>
                           <a:latin typeface="Arial" panose="020B0604020202020204" pitchFamily="34" charset="0"/>
                           <a:cs typeface="Arial" panose="020B0604020202020204" pitchFamily="34" charset="0"/>
                         </a:rPr>
                         <a:t>Seccion</a:t>
                       </a:r>
-                      <a:endParaRPr lang="es-CO" sz="1200" b="0" i="0" u="none" strike="noStrike">
+                      <a:endParaRPr lang="es-CO" sz="1200" b="0" i="0" u="none" strike="noStrike" dirty="0">
                         <a:solidFill>
                           <a:srgbClr val="000000"/>
                         </a:solidFill>
@@ -10817,7 +10639,7 @@
                 </a:tc>
                 <a:extLst>
                   <a:ext uri="{0D108BD9-81ED-4DB2-BD59-A6C34878D82A}">
-                    <a16:rowId xmlns:a16="http://schemas.microsoft.com/office/drawing/2014/main" val="1205791969"/>
+                    <a16:rowId xmlns:a16="http://schemas.microsoft.com/office/drawing/2014/main" xmlns="" val="1205791969"/>
                   </a:ext>
                 </a:extLst>
               </a:tr>
@@ -10948,7 +10770,7 @@
                 </a:tc>
                 <a:extLst>
                   <a:ext uri="{0D108BD9-81ED-4DB2-BD59-A6C34878D82A}">
-                    <a16:rowId xmlns:a16="http://schemas.microsoft.com/office/drawing/2014/main" val="3190319937"/>
+                    <a16:rowId xmlns:a16="http://schemas.microsoft.com/office/drawing/2014/main" xmlns="" val="3190319937"/>
                   </a:ext>
                 </a:extLst>
               </a:tr>
@@ -10986,14 +10808,14 @@
                     <a:p>
                       <a:pPr algn="ctr" fontAlgn="ctr"/>
                       <a:r>
-                        <a:rPr lang="es-CO" sz="1200" u="none" strike="noStrike">
+                        <a:rPr lang="es-CO" sz="1200" u="none" strike="noStrike" dirty="0">
                           <a:effectLst/>
                           <a:latin typeface="Arial" panose="020B0604020202020204" pitchFamily="34" charset="0"/>
                           <a:cs typeface="Arial" panose="020B0604020202020204" pitchFamily="34" charset="0"/>
                         </a:rPr>
                         <a:t>Docente</a:t>
                       </a:r>
-                      <a:endParaRPr lang="es-CO" sz="1200" b="0" i="0" u="none" strike="noStrike">
+                      <a:endParaRPr lang="es-CO" sz="1200" b="0" i="0" u="none" strike="noStrike" dirty="0">
                         <a:solidFill>
                           <a:srgbClr val="000000"/>
                         </a:solidFill>
@@ -11111,7 +10933,7 @@
                 </a:tc>
                 <a:extLst>
                   <a:ext uri="{0D108BD9-81ED-4DB2-BD59-A6C34878D82A}">
-                    <a16:rowId xmlns:a16="http://schemas.microsoft.com/office/drawing/2014/main" val="3057983255"/>
+                    <a16:rowId xmlns:a16="http://schemas.microsoft.com/office/drawing/2014/main" xmlns="" val="3057983255"/>
                   </a:ext>
                 </a:extLst>
               </a:tr>
@@ -11258,7 +11080,7 @@
                 </a:tc>
                 <a:extLst>
                   <a:ext uri="{0D108BD9-81ED-4DB2-BD59-A6C34878D82A}">
-                    <a16:rowId xmlns:a16="http://schemas.microsoft.com/office/drawing/2014/main" val="142723232"/>
+                    <a16:rowId xmlns:a16="http://schemas.microsoft.com/office/drawing/2014/main" xmlns="" val="142723232"/>
                   </a:ext>
                 </a:extLst>
               </a:tr>
@@ -11405,7 +11227,7 @@
                 </a:tc>
                 <a:extLst>
                   <a:ext uri="{0D108BD9-81ED-4DB2-BD59-A6C34878D82A}">
-                    <a16:rowId xmlns:a16="http://schemas.microsoft.com/office/drawing/2014/main" val="2010654794"/>
+                    <a16:rowId xmlns:a16="http://schemas.microsoft.com/office/drawing/2014/main" xmlns="" val="2010654794"/>
                   </a:ext>
                 </a:extLst>
               </a:tr>
@@ -11552,7 +11374,7 @@
                 </a:tc>
                 <a:extLst>
                   <a:ext uri="{0D108BD9-81ED-4DB2-BD59-A6C34878D82A}">
-                    <a16:rowId xmlns:a16="http://schemas.microsoft.com/office/drawing/2014/main" val="3090693922"/>
+                    <a16:rowId xmlns:a16="http://schemas.microsoft.com/office/drawing/2014/main" xmlns="" val="3090693922"/>
                   </a:ext>
                 </a:extLst>
               </a:tr>
@@ -11715,7 +11537,7 @@
                 </a:tc>
                 <a:extLst>
                   <a:ext uri="{0D108BD9-81ED-4DB2-BD59-A6C34878D82A}">
-                    <a16:rowId xmlns:a16="http://schemas.microsoft.com/office/drawing/2014/main" val="627599904"/>
+                    <a16:rowId xmlns:a16="http://schemas.microsoft.com/office/drawing/2014/main" xmlns="" val="627599904"/>
                   </a:ext>
                 </a:extLst>
               </a:tr>
@@ -11862,7 +11684,7 @@
                 </a:tc>
                 <a:extLst>
                   <a:ext uri="{0D108BD9-81ED-4DB2-BD59-A6C34878D82A}">
-                    <a16:rowId xmlns:a16="http://schemas.microsoft.com/office/drawing/2014/main" val="2241206887"/>
+                    <a16:rowId xmlns:a16="http://schemas.microsoft.com/office/drawing/2014/main" xmlns="" val="2241206887"/>
                   </a:ext>
                 </a:extLst>
               </a:tr>
@@ -12009,7 +11831,7 @@
                 </a:tc>
                 <a:extLst>
                   <a:ext uri="{0D108BD9-81ED-4DB2-BD59-A6C34878D82A}">
-                    <a16:rowId xmlns:a16="http://schemas.microsoft.com/office/drawing/2014/main" val="552371880"/>
+                    <a16:rowId xmlns:a16="http://schemas.microsoft.com/office/drawing/2014/main" xmlns="" val="552371880"/>
                   </a:ext>
                 </a:extLst>
               </a:tr>
@@ -12156,7 +11978,7 @@
                 </a:tc>
                 <a:extLst>
                   <a:ext uri="{0D108BD9-81ED-4DB2-BD59-A6C34878D82A}">
-                    <a16:rowId xmlns:a16="http://schemas.microsoft.com/office/drawing/2014/main" val="116541910"/>
+                    <a16:rowId xmlns:a16="http://schemas.microsoft.com/office/drawing/2014/main" xmlns="" val="116541910"/>
                   </a:ext>
                 </a:extLst>
               </a:tr>
@@ -12303,7 +12125,7 @@
                 </a:tc>
                 <a:extLst>
                   <a:ext uri="{0D108BD9-81ED-4DB2-BD59-A6C34878D82A}">
-                    <a16:rowId xmlns:a16="http://schemas.microsoft.com/office/drawing/2014/main" val="1742673978"/>
+                    <a16:rowId xmlns:a16="http://schemas.microsoft.com/office/drawing/2014/main" xmlns="" val="1742673978"/>
                   </a:ext>
                 </a:extLst>
               </a:tr>
@@ -12450,7 +12272,7 @@
                 </a:tc>
                 <a:extLst>
                   <a:ext uri="{0D108BD9-81ED-4DB2-BD59-A6C34878D82A}">
-                    <a16:rowId xmlns:a16="http://schemas.microsoft.com/office/drawing/2014/main" val="722975958"/>
+                    <a16:rowId xmlns:a16="http://schemas.microsoft.com/office/drawing/2014/main" xmlns="" val="722975958"/>
                   </a:ext>
                 </a:extLst>
               </a:tr>
@@ -12613,7 +12435,7 @@
                 </a:tc>
                 <a:extLst>
                   <a:ext uri="{0D108BD9-81ED-4DB2-BD59-A6C34878D82A}">
-                    <a16:rowId xmlns:a16="http://schemas.microsoft.com/office/drawing/2014/main" val="2653783117"/>
+                    <a16:rowId xmlns:a16="http://schemas.microsoft.com/office/drawing/2014/main" xmlns="" val="2653783117"/>
                   </a:ext>
                 </a:extLst>
               </a:tr>
@@ -12717,7 +12539,7 @@
           <p:cNvPr id="8" name="Chart 1" title="Chart">
             <a:extLst>
               <a:ext uri="{FF2B5EF4-FFF2-40B4-BE49-F238E27FC236}">
-                <a16:creationId xmlns:a16="http://schemas.microsoft.com/office/drawing/2014/main" id="{00000000-0008-0000-0000-000003000000}"/>
+                <a16:creationId xmlns:a16="http://schemas.microsoft.com/office/drawing/2014/main" xmlns="" id="{00000000-0008-0000-0000-000003000000}"/>
               </a:ext>
             </a:extLst>
           </p:cNvPr>
@@ -12727,14 +12549,14 @@
           <p:nvPr>
             <p:extLst>
               <p:ext uri="{D42A27DB-BD31-4B8C-83A1-F6EECF244321}">
-                <p14:modId xmlns:p14="http://schemas.microsoft.com/office/powerpoint/2010/main" val="4094331215"/>
+                <p14:modId xmlns:p14="http://schemas.microsoft.com/office/powerpoint/2010/main" val="1650589309"/>
               </p:ext>
             </p:extLst>
           </p:nvPr>
         </p:nvGraphicFramePr>
         <p:xfrm>
-          <a:off x="137337" y="4059758"/>
-          <a:ext cx="7878726" cy="2798242"/>
+          <a:off x="632637" y="3843627"/>
+          <a:ext cx="7563712" cy="2798242"/>
         </p:xfrm>
         <a:graphic>
           <a:graphicData uri="http://schemas.openxmlformats.org/drawingml/2006/chart">
@@ -12747,7 +12569,7 @@
           <p:cNvPr id="9" name="Chart 1" title="Chart">
             <a:extLst>
               <a:ext uri="{FF2B5EF4-FFF2-40B4-BE49-F238E27FC236}">
-                <a16:creationId xmlns:a16="http://schemas.microsoft.com/office/drawing/2014/main" id="{00000000-0008-0000-0000-000002000000}"/>
+                <a16:creationId xmlns:a16="http://schemas.microsoft.com/office/drawing/2014/main" xmlns="" id="{00000000-0008-0000-0000-000002000000}"/>
               </a:ext>
             </a:extLst>
           </p:cNvPr>
@@ -12757,13 +12579,13 @@
           <p:nvPr>
             <p:extLst>
               <p:ext uri="{D42A27DB-BD31-4B8C-83A1-F6EECF244321}">
-                <p14:modId xmlns:p14="http://schemas.microsoft.com/office/powerpoint/2010/main" val="700967335"/>
+                <p14:modId xmlns:p14="http://schemas.microsoft.com/office/powerpoint/2010/main" val="2606624011"/>
               </p:ext>
             </p:extLst>
           </p:nvPr>
         </p:nvGraphicFramePr>
         <p:xfrm>
-          <a:off x="137337" y="972556"/>
+          <a:off x="577912" y="906053"/>
           <a:ext cx="7496839" cy="2798242"/>
         </p:xfrm>
         <a:graphic>
@@ -12868,7 +12690,7 @@
           <p:cNvPr id="3" name="CuadroTexto 2">
             <a:extLst>
               <a:ext uri="{FF2B5EF4-FFF2-40B4-BE49-F238E27FC236}">
-                <a16:creationId xmlns:a16="http://schemas.microsoft.com/office/drawing/2014/main" id="{EB5CEF16-DF68-4175-87A1-37A37A1E0664}"/>
+                <a16:creationId xmlns:a16="http://schemas.microsoft.com/office/drawing/2014/main" xmlns="" id="{EB5CEF16-DF68-4175-87A1-37A37A1E0664}"/>
               </a:ext>
             </a:extLst>
           </p:cNvPr>
@@ -12878,7 +12700,7 @@
         <p:spPr>
           <a:xfrm>
             <a:off x="591236" y="1339703"/>
-            <a:ext cx="7106735" cy="3477875"/>
+            <a:ext cx="7106735" cy="4401205"/>
           </a:xfrm>
           <a:prstGeom prst="rect">
             <a:avLst/>
@@ -12906,7 +12728,72 @@
                 <a:latin typeface="Arial" panose="020B0604020202020204" pitchFamily="34" charset="0"/>
                 <a:cs typeface="Arial" panose="020B0604020202020204" pitchFamily="34" charset="0"/>
               </a:rPr>
-              <a:t>Problemas con PrimeFaces, solución un tema con ThemeRoller para hacer más amigable el diseño.</a:t>
+              <a:t>Problemas con PrimeFaces, solución un tema con </a:t>
+            </a:r>
+            <a:r>
+              <a:rPr lang="es-CO" sz="2000" dirty="0" err="1">
+                <a:solidFill>
+                  <a:schemeClr val="tx1">
+                    <a:lumMod val="85000"/>
+                    <a:lumOff val="15000"/>
+                  </a:schemeClr>
+                </a:solidFill>
+                <a:latin typeface="Arial" panose="020B0604020202020204" pitchFamily="34" charset="0"/>
+                <a:cs typeface="Arial" panose="020B0604020202020204" pitchFamily="34" charset="0"/>
+              </a:rPr>
+              <a:t>T</a:t>
+            </a:r>
+            <a:r>
+              <a:rPr lang="es-CO" sz="2000" dirty="0" err="1" smtClean="0">
+                <a:solidFill>
+                  <a:schemeClr val="tx1">
+                    <a:lumMod val="85000"/>
+                    <a:lumOff val="15000"/>
+                  </a:schemeClr>
+                </a:solidFill>
+                <a:latin typeface="Arial" panose="020B0604020202020204" pitchFamily="34" charset="0"/>
+                <a:cs typeface="Arial" panose="020B0604020202020204" pitchFamily="34" charset="0"/>
+              </a:rPr>
+              <a:t>hemeRoller</a:t>
+            </a:r>
+            <a:r>
+              <a:rPr lang="es-CO" sz="2000" dirty="0" smtClean="0">
+                <a:solidFill>
+                  <a:schemeClr val="tx1">
+                    <a:lumMod val="85000"/>
+                    <a:lumOff val="15000"/>
+                  </a:schemeClr>
+                </a:solidFill>
+                <a:latin typeface="Arial" panose="020B0604020202020204" pitchFamily="34" charset="0"/>
+                <a:cs typeface="Arial" panose="020B0604020202020204" pitchFamily="34" charset="0"/>
+              </a:rPr>
+              <a:t> </a:t>
+            </a:r>
+            <a:r>
+              <a:rPr lang="es-CO" sz="2000" dirty="0">
+                <a:solidFill>
+                  <a:schemeClr val="tx1">
+                    <a:lumMod val="85000"/>
+                    <a:lumOff val="15000"/>
+                  </a:schemeClr>
+                </a:solidFill>
+                <a:latin typeface="Arial" panose="020B0604020202020204" pitchFamily="34" charset="0"/>
+                <a:cs typeface="Arial" panose="020B0604020202020204" pitchFamily="34" charset="0"/>
+              </a:rPr>
+              <a:t>para hacer más amigable el diseño</a:t>
+            </a:r>
+            <a:r>
+              <a:rPr lang="es-CO" sz="2000" dirty="0" smtClean="0">
+                <a:solidFill>
+                  <a:schemeClr val="tx1">
+                    <a:lumMod val="85000"/>
+                    <a:lumOff val="15000"/>
+                  </a:schemeClr>
+                </a:solidFill>
+                <a:latin typeface="Arial" panose="020B0604020202020204" pitchFamily="34" charset="0"/>
+                <a:cs typeface="Arial" panose="020B0604020202020204" pitchFamily="34" charset="0"/>
+              </a:rPr>
+              <a:t>.</a:t>
             </a:r>
           </a:p>
           <a:p>
@@ -12914,19 +12801,16 @@
               <a:buFont typeface="Arial" panose="020B0604020202020204" pitchFamily="34" charset="0"/>
               <a:buChar char="•"/>
             </a:pPr>
-            <a:r>
-              <a:rPr lang="es-CO" sz="2000" dirty="0">
-                <a:solidFill>
-                  <a:schemeClr val="tx1">
-                    <a:lumMod val="85000"/>
-                    <a:lumOff val="15000"/>
-                  </a:schemeClr>
-                </a:solidFill>
-                <a:latin typeface="Arial" panose="020B0604020202020204" pitchFamily="34" charset="0"/>
-                <a:cs typeface="Arial" panose="020B0604020202020204" pitchFamily="34" charset="0"/>
-              </a:rPr>
-              <a:t>Problemas con JaspeReports, solución flying-saucer-pdf e itext</a:t>
-            </a:r>
+            <a:endParaRPr lang="es-CO" sz="2000" dirty="0">
+              <a:solidFill>
+                <a:schemeClr val="tx1">
+                  <a:lumMod val="85000"/>
+                  <a:lumOff val="15000"/>
+                </a:schemeClr>
+              </a:solidFill>
+              <a:latin typeface="Arial" panose="020B0604020202020204" pitchFamily="34" charset="0"/>
+              <a:cs typeface="Arial" panose="020B0604020202020204" pitchFamily="34" charset="0"/>
+            </a:endParaRPr>
           </a:p>
           <a:p>
             <a:pPr marL="285750" indent="-285750">
@@ -12944,8 +12828,98 @@
                 <a:latin typeface="Arial" panose="020B0604020202020204" pitchFamily="34" charset="0"/>
                 <a:cs typeface="Arial" panose="020B0604020202020204" pitchFamily="34" charset="0"/>
               </a:rPr>
-              <a:t>Encontrar un servidor con las especificaciones necesarias para que corriera el proyecto.</a:t>
-            </a:r>
+              <a:t>Problemas con JaspeReports, solución flying-saucer-pdf e </a:t>
+            </a:r>
+            <a:r>
+              <a:rPr lang="es-CO" sz="2000" dirty="0" err="1" smtClean="0">
+                <a:solidFill>
+                  <a:schemeClr val="tx1">
+                    <a:lumMod val="85000"/>
+                    <a:lumOff val="15000"/>
+                  </a:schemeClr>
+                </a:solidFill>
+                <a:latin typeface="Arial" panose="020B0604020202020204" pitchFamily="34" charset="0"/>
+                <a:cs typeface="Arial" panose="020B0604020202020204" pitchFamily="34" charset="0"/>
+              </a:rPr>
+              <a:t>itext</a:t>
+            </a:r>
+            <a:r>
+              <a:rPr lang="es-CO" sz="2000" dirty="0" smtClean="0">
+                <a:solidFill>
+                  <a:schemeClr val="tx1">
+                    <a:lumMod val="85000"/>
+                    <a:lumOff val="15000"/>
+                  </a:schemeClr>
+                </a:solidFill>
+                <a:latin typeface="Arial" panose="020B0604020202020204" pitchFamily="34" charset="0"/>
+                <a:cs typeface="Arial" panose="020B0604020202020204" pitchFamily="34" charset="0"/>
+              </a:rPr>
+              <a:t>.</a:t>
+            </a:r>
+          </a:p>
+          <a:p>
+            <a:pPr marL="285750" indent="-285750">
+              <a:buFont typeface="Arial" panose="020B0604020202020204" pitchFamily="34" charset="0"/>
+              <a:buChar char="•"/>
+            </a:pPr>
+            <a:endParaRPr lang="es-CO" sz="2000" dirty="0">
+              <a:solidFill>
+                <a:schemeClr val="tx1">
+                  <a:lumMod val="85000"/>
+                  <a:lumOff val="15000"/>
+                </a:schemeClr>
+              </a:solidFill>
+              <a:latin typeface="Arial" panose="020B0604020202020204" pitchFamily="34" charset="0"/>
+              <a:cs typeface="Arial" panose="020B0604020202020204" pitchFamily="34" charset="0"/>
+            </a:endParaRPr>
+          </a:p>
+          <a:p>
+            <a:pPr marL="285750" indent="-285750">
+              <a:buFont typeface="Arial" panose="020B0604020202020204" pitchFamily="34" charset="0"/>
+              <a:buChar char="•"/>
+            </a:pPr>
+            <a:r>
+              <a:rPr lang="es-CO" sz="2000" dirty="0">
+                <a:solidFill>
+                  <a:schemeClr val="tx1">
+                    <a:lumMod val="85000"/>
+                    <a:lumOff val="15000"/>
+                  </a:schemeClr>
+                </a:solidFill>
+                <a:latin typeface="Arial" panose="020B0604020202020204" pitchFamily="34" charset="0"/>
+                <a:cs typeface="Arial" panose="020B0604020202020204" pitchFamily="34" charset="0"/>
+              </a:rPr>
+              <a:t>Encontrar un servidor con las especificaciones necesarias para que corriera el proyecto</a:t>
+            </a:r>
+            <a:r>
+              <a:rPr lang="es-CO" sz="2000" dirty="0" smtClean="0">
+                <a:solidFill>
+                  <a:schemeClr val="tx1">
+                    <a:lumMod val="85000"/>
+                    <a:lumOff val="15000"/>
+                  </a:schemeClr>
+                </a:solidFill>
+                <a:latin typeface="Arial" panose="020B0604020202020204" pitchFamily="34" charset="0"/>
+                <a:cs typeface="Arial" panose="020B0604020202020204" pitchFamily="34" charset="0"/>
+              </a:rPr>
+              <a:t>.</a:t>
+            </a:r>
+          </a:p>
+          <a:p>
+            <a:pPr marL="285750" indent="-285750">
+              <a:buFont typeface="Arial" panose="020B0604020202020204" pitchFamily="34" charset="0"/>
+              <a:buChar char="•"/>
+            </a:pPr>
+            <a:endParaRPr lang="es-CO" sz="2000" dirty="0">
+              <a:solidFill>
+                <a:schemeClr val="tx1">
+                  <a:lumMod val="85000"/>
+                  <a:lumOff val="15000"/>
+                </a:schemeClr>
+              </a:solidFill>
+              <a:latin typeface="Arial" panose="020B0604020202020204" pitchFamily="34" charset="0"/>
+              <a:cs typeface="Arial" panose="020B0604020202020204" pitchFamily="34" charset="0"/>
+            </a:endParaRPr>
           </a:p>
           <a:p>
             <a:pPr marL="285750" indent="-285750">
@@ -13090,7 +13064,7 @@
           <p:cNvPr id="3" name="CuadroTexto 2">
             <a:extLst>
               <a:ext uri="{FF2B5EF4-FFF2-40B4-BE49-F238E27FC236}">
-                <a16:creationId xmlns:a16="http://schemas.microsoft.com/office/drawing/2014/main" id="{B3E05B2C-448F-4ECF-BEF8-9F8192CC5623}"/>
+                <a16:creationId xmlns:a16="http://schemas.microsoft.com/office/drawing/2014/main" xmlns="" id="{B3E05B2C-448F-4ECF-BEF8-9F8192CC5623}"/>
               </a:ext>
             </a:extLst>
           </p:cNvPr>
@@ -13099,8 +13073,8 @@
         </p:nvSpPr>
         <p:spPr>
           <a:xfrm>
-            <a:off x="761357" y="1562985"/>
-            <a:ext cx="6915350" cy="1938992"/>
+            <a:off x="761357" y="1837305"/>
+            <a:ext cx="6915350" cy="2554545"/>
           </a:xfrm>
           <a:prstGeom prst="rect">
             <a:avLst/>
@@ -13130,12 +13104,38 @@
               </a:rPr>
               <a:t>Ampliar el alcance del software. </a:t>
             </a:r>
+            <a:endParaRPr lang="es-CO" sz="2000" dirty="0" smtClean="0">
+              <a:solidFill>
+                <a:schemeClr val="tx1">
+                  <a:lumMod val="85000"/>
+                  <a:lumOff val="15000"/>
+                </a:schemeClr>
+              </a:solidFill>
+              <a:latin typeface="Arial" panose="020B0604020202020204" pitchFamily="34" charset="0"/>
+              <a:cs typeface="Arial" panose="020B0604020202020204" pitchFamily="34" charset="0"/>
+            </a:endParaRPr>
           </a:p>
           <a:p>
             <a:pPr marL="285750" lvl="0" indent="-285750">
               <a:buFont typeface="Arial" panose="020B0604020202020204" pitchFamily="34" charset="0"/>
               <a:buChar char="•"/>
             </a:pPr>
+            <a:endParaRPr lang="es-CO" sz="2000" dirty="0">
+              <a:solidFill>
+                <a:schemeClr val="tx1">
+                  <a:lumMod val="85000"/>
+                  <a:lumOff val="15000"/>
+                </a:schemeClr>
+              </a:solidFill>
+              <a:latin typeface="Arial" panose="020B0604020202020204" pitchFamily="34" charset="0"/>
+              <a:cs typeface="Arial" panose="020B0604020202020204" pitchFamily="34" charset="0"/>
+            </a:endParaRPr>
+          </a:p>
+          <a:p>
+            <a:pPr marL="285750" lvl="0" indent="-285750">
+              <a:buFont typeface="Arial" panose="020B0604020202020204" pitchFamily="34" charset="0"/>
+              <a:buChar char="•"/>
+            </a:pPr>
             <a:r>
               <a:rPr lang="es-CO" sz="2000" dirty="0">
                 <a:solidFill>
@@ -13149,6 +13149,29 @@
               </a:rPr>
               <a:t>El uso de librerías o frameworks debe estar sujeto a la compatibilidad con los demás elementos o herramientas usadas, es muy importante tener en cuenta las versiones y con cuales tienen mejor desempeño. </a:t>
             </a:r>
+            <a:endParaRPr lang="es-CO" sz="2000" dirty="0" smtClean="0">
+              <a:solidFill>
+                <a:schemeClr val="tx1">
+                  <a:lumMod val="85000"/>
+                  <a:lumOff val="15000"/>
+                </a:schemeClr>
+              </a:solidFill>
+              <a:latin typeface="Arial" panose="020B0604020202020204" pitchFamily="34" charset="0"/>
+              <a:cs typeface="Arial" panose="020B0604020202020204" pitchFamily="34" charset="0"/>
+            </a:endParaRPr>
+          </a:p>
+          <a:p>
+            <a:pPr lvl="0"/>
+            <a:endParaRPr lang="es-CO" sz="2000" dirty="0">
+              <a:solidFill>
+                <a:schemeClr val="tx1">
+                  <a:lumMod val="85000"/>
+                  <a:lumOff val="15000"/>
+                </a:schemeClr>
+              </a:solidFill>
+              <a:latin typeface="Arial" panose="020B0604020202020204" pitchFamily="34" charset="0"/>
+              <a:cs typeface="Arial" panose="020B0604020202020204" pitchFamily="34" charset="0"/>
+            </a:endParaRPr>
           </a:p>
           <a:p>
             <a:pPr marL="285750" lvl="0" indent="-285750">
@@ -13267,7 +13290,7 @@
           <p:cNvPr id="2" name="CuadroTexto 1">
             <a:extLst>
               <a:ext uri="{FF2B5EF4-FFF2-40B4-BE49-F238E27FC236}">
-                <a16:creationId xmlns:a16="http://schemas.microsoft.com/office/drawing/2014/main" id="{585F2FF1-E103-438A-A5E2-394CD4C49ABE}"/>
+                <a16:creationId xmlns:a16="http://schemas.microsoft.com/office/drawing/2014/main" xmlns="" id="{585F2FF1-E103-438A-A5E2-394CD4C49ABE}"/>
               </a:ext>
             </a:extLst>
           </p:cNvPr>
@@ -13613,7 +13636,7 @@
           <p:cNvPr id="2" name="CuadroTexto 1">
             <a:extLst>
               <a:ext uri="{FF2B5EF4-FFF2-40B4-BE49-F238E27FC236}">
-                <a16:creationId xmlns:a16="http://schemas.microsoft.com/office/drawing/2014/main" id="{4C0880D7-B166-4F0F-ACAC-974216E18C56}"/>
+                <a16:creationId xmlns:a16="http://schemas.microsoft.com/office/drawing/2014/main" xmlns="" id="{4C0880D7-B166-4F0F-ACAC-974216E18C56}"/>
               </a:ext>
             </a:extLst>
           </p:cNvPr>
@@ -14169,7 +14192,7 @@
           <p:cNvPr id="2" name="CuadroTexto 1">
             <a:extLst>
               <a:ext uri="{FF2B5EF4-FFF2-40B4-BE49-F238E27FC236}">
-                <a16:creationId xmlns:a16="http://schemas.microsoft.com/office/drawing/2014/main" id="{4C0880D7-B166-4F0F-ACAC-974216E18C56}"/>
+                <a16:creationId xmlns:a16="http://schemas.microsoft.com/office/drawing/2014/main" xmlns="" id="{4C0880D7-B166-4F0F-ACAC-974216E18C56}"/>
               </a:ext>
             </a:extLst>
           </p:cNvPr>
@@ -14485,7 +14508,7 @@
           <p:cNvPr id="2" name="CuadroTexto 1">
             <a:extLst>
               <a:ext uri="{FF2B5EF4-FFF2-40B4-BE49-F238E27FC236}">
-                <a16:creationId xmlns:a16="http://schemas.microsoft.com/office/drawing/2014/main" id="{4C0880D7-B166-4F0F-ACAC-974216E18C56}"/>
+                <a16:creationId xmlns:a16="http://schemas.microsoft.com/office/drawing/2014/main" xmlns="" id="{4C0880D7-B166-4F0F-ACAC-974216E18C56}"/>
               </a:ext>
             </a:extLst>
           </p:cNvPr>
@@ -14812,7 +14835,7 @@
         </p:nvSpPr>
         <p:spPr>
           <a:xfrm>
-            <a:off x="601590" y="769404"/>
+            <a:off x="1333110" y="782350"/>
             <a:ext cx="6264696" cy="445507"/>
           </a:xfrm>
           <a:prstGeom prst="rect">
@@ -14873,7 +14896,7 @@
         </p:nvSpPr>
         <p:spPr>
           <a:xfrm>
-            <a:off x="739813" y="2405762"/>
+            <a:off x="1266565" y="2497202"/>
             <a:ext cx="6610869" cy="2246769"/>
           </a:xfrm>
           <a:prstGeom prst="rect">
@@ -15003,7 +15026,7 @@
         <p:spPr>
           <a:xfrm>
             <a:off x="695246" y="1805746"/>
-            <a:ext cx="7738394" cy="3170099"/>
+            <a:ext cx="7738394" cy="3785652"/>
           </a:xfrm>
           <a:prstGeom prst="rect">
             <a:avLst/>
@@ -15030,7 +15053,20 @@
                 <a:latin typeface="Arial" panose="020B0604020202020204" pitchFamily="34" charset="0"/>
                 <a:cs typeface="Arial" panose="020B0604020202020204" pitchFamily="34" charset="0"/>
               </a:rPr>
-              <a:t>Diseñar una arquitectura software que permita gestionar el proceso de planeación de las actividades de los docentes de tiempo completo, basados en el formato R-DC-54 de las UTS.</a:t>
+              <a:t>Diseñar una arquitectura software que permita gestionar el proceso de planeación de las actividades de los docentes de tiempo completo, basados en el formato R-DC-54 de las UTS</a:t>
+            </a:r>
+            <a:r>
+              <a:rPr lang="es-CO" sz="2000" dirty="0" smtClean="0">
+                <a:solidFill>
+                  <a:schemeClr val="tx1">
+                    <a:lumMod val="85000"/>
+                    <a:lumOff val="15000"/>
+                  </a:schemeClr>
+                </a:solidFill>
+                <a:latin typeface="Arial" panose="020B0604020202020204" pitchFamily="34" charset="0"/>
+                <a:cs typeface="Arial" panose="020B0604020202020204" pitchFamily="34" charset="0"/>
+              </a:rPr>
+              <a:t>.</a:t>
             </a:r>
           </a:p>
           <a:p>
@@ -15038,6 +15074,22 @@
               <a:buFont typeface="Arial" panose="020B0604020202020204" pitchFamily="34" charset="0"/>
               <a:buChar char="•"/>
             </a:pPr>
+            <a:endParaRPr lang="es-CO" sz="2000" dirty="0">
+              <a:solidFill>
+                <a:schemeClr val="tx1">
+                  <a:lumMod val="85000"/>
+                  <a:lumOff val="15000"/>
+                </a:schemeClr>
+              </a:solidFill>
+              <a:latin typeface="Arial" panose="020B0604020202020204" pitchFamily="34" charset="0"/>
+              <a:cs typeface="Arial" panose="020B0604020202020204" pitchFamily="34" charset="0"/>
+            </a:endParaRPr>
+          </a:p>
+          <a:p>
+            <a:pPr marL="342900" indent="-342900" algn="just">
+              <a:buFont typeface="Arial" panose="020B0604020202020204" pitchFamily="34" charset="0"/>
+              <a:buChar char="•"/>
+            </a:pPr>
             <a:r>
               <a:rPr lang="es-CO" sz="2000" dirty="0">
                 <a:solidFill>
@@ -15049,8 +15101,37 @@
                 <a:latin typeface="Arial" panose="020B0604020202020204" pitchFamily="34" charset="0"/>
                 <a:cs typeface="Arial" panose="020B0604020202020204" pitchFamily="34" charset="0"/>
               </a:rPr>
-              <a:t>Desarrollar, codificar e implementar el código fuente correspondiente a los modelos para el correcto funcionamiento de la aplicación basado en los modelos y estructuras planteadas anteriormente.</a:t>
-            </a:r>
+              <a:t>Desarrollar, codificar e implementar el código fuente correspondiente a los modelos para el correcto funcionamiento de la aplicación basado en los modelos y estructuras planteadas anteriormente</a:t>
+            </a:r>
+            <a:r>
+              <a:rPr lang="es-CO" sz="2000" dirty="0" smtClean="0">
+                <a:solidFill>
+                  <a:schemeClr val="tx1">
+                    <a:lumMod val="85000"/>
+                    <a:lumOff val="15000"/>
+                  </a:schemeClr>
+                </a:solidFill>
+                <a:latin typeface="Arial" panose="020B0604020202020204" pitchFamily="34" charset="0"/>
+                <a:cs typeface="Arial" panose="020B0604020202020204" pitchFamily="34" charset="0"/>
+              </a:rPr>
+              <a:t>.</a:t>
+            </a:r>
+          </a:p>
+          <a:p>
+            <a:pPr marL="342900" indent="-342900" algn="just">
+              <a:buFont typeface="Arial" panose="020B0604020202020204" pitchFamily="34" charset="0"/>
+              <a:buChar char="•"/>
+            </a:pPr>
+            <a:endParaRPr lang="es-CO" sz="2000" dirty="0">
+              <a:solidFill>
+                <a:schemeClr val="tx1">
+                  <a:lumMod val="85000"/>
+                  <a:lumOff val="15000"/>
+                </a:schemeClr>
+              </a:solidFill>
+              <a:latin typeface="Arial" panose="020B0604020202020204" pitchFamily="34" charset="0"/>
+              <a:cs typeface="Arial" panose="020B0604020202020204" pitchFamily="34" charset="0"/>
+            </a:endParaRPr>
           </a:p>
           <a:p>
             <a:pPr marL="342900" indent="-342900" algn="just">
@@ -15395,7 +15476,7 @@
           <p:cNvPr id="4" name="Imagen 3">
             <a:extLst>
               <a:ext uri="{FF2B5EF4-FFF2-40B4-BE49-F238E27FC236}">
-                <a16:creationId xmlns:a16="http://schemas.microsoft.com/office/drawing/2014/main" id="{16D90900-6598-4986-AE8B-5DE9E3CE52D9}"/>
+                <a16:creationId xmlns:a16="http://schemas.microsoft.com/office/drawing/2014/main" xmlns="" id="{16D90900-6598-4986-AE8B-5DE9E3CE52D9}"/>
               </a:ext>
             </a:extLst>
           </p:cNvPr>
@@ -15424,6 +15505,16 @@
           <a:prstGeom prst="rect">
             <a:avLst/>
           </a:prstGeom>
+          <a:ln>
+            <a:noFill/>
+          </a:ln>
+          <a:effectLst>
+            <a:outerShdw blurRad="292100" dist="139700" dir="2700000" algn="tl" rotWithShape="0">
+              <a:srgbClr val="333333">
+                <a:alpha val="65000"/>
+              </a:srgbClr>
+            </a:outerShdw>
+          </a:effectLst>
         </p:spPr>
       </p:pic>
     </p:spTree>
@@ -15576,6 +15667,16 @@
           <a:prstGeom prst="rect">
             <a:avLst/>
           </a:prstGeom>
+          <a:ln>
+            <a:noFill/>
+          </a:ln>
+          <a:effectLst>
+            <a:outerShdw blurRad="292100" dist="139700" dir="2700000" algn="tl" rotWithShape="0">
+              <a:srgbClr val="333333">
+                <a:alpha val="65000"/>
+              </a:srgbClr>
+            </a:outerShdw>
+          </a:effectLst>
         </p:spPr>
       </p:pic>
       <p:sp>
@@ -15899,6 +16000,16 @@
           <a:prstGeom prst="rect">
             <a:avLst/>
           </a:prstGeom>
+          <a:ln>
+            <a:noFill/>
+          </a:ln>
+          <a:effectLst>
+            <a:outerShdw blurRad="292100" dist="139700" dir="2700000" algn="tl" rotWithShape="0">
+              <a:srgbClr val="333333">
+                <a:alpha val="65000"/>
+              </a:srgbClr>
+            </a:outerShdw>
+          </a:effectLst>
         </p:spPr>
       </p:pic>
       <p:sp>
@@ -15984,6 +16095,16 @@
           <a:prstGeom prst="rect">
             <a:avLst/>
           </a:prstGeom>
+          <a:ln>
+            <a:noFill/>
+          </a:ln>
+          <a:effectLst>
+            <a:outerShdw blurRad="292100" dist="139700" dir="2700000" algn="tl" rotWithShape="0">
+              <a:srgbClr val="333333">
+                <a:alpha val="65000"/>
+              </a:srgbClr>
+            </a:outerShdw>
+          </a:effectLst>
         </p:spPr>
       </p:pic>
       <p:sp>
@@ -15991,7 +16112,7 @@
           <p:cNvPr id="3" name="CuadroTexto 2">
             <a:extLst>
               <a:ext uri="{FF2B5EF4-FFF2-40B4-BE49-F238E27FC236}">
-                <a16:creationId xmlns:a16="http://schemas.microsoft.com/office/drawing/2014/main" id="{E9CC970F-E4E6-47B4-894B-BB9D00F1CF33}"/>
+                <a16:creationId xmlns:a16="http://schemas.microsoft.com/office/drawing/2014/main" xmlns="" id="{E9CC970F-E4E6-47B4-894B-BB9D00F1CF33}"/>
               </a:ext>
             </a:extLst>
           </p:cNvPr>
@@ -16090,8 +16211,27 @@
                   </a:schemeClr>
                 </a:solidFill>
               </a:rPr>
-              <a:t>Registro de Actividades y productos</a:t>
-            </a:r>
+              <a:t>Registro de Actividades y </a:t>
+            </a:r>
+            <a:r>
+              <a:rPr lang="es-CO" dirty="0" smtClean="0">
+                <a:solidFill>
+                  <a:schemeClr val="tx1">
+                    <a:lumMod val="85000"/>
+                    <a:lumOff val="15000"/>
+                  </a:schemeClr>
+                </a:solidFill>
+              </a:rPr>
+              <a:t>Productos</a:t>
+            </a:r>
+            <a:endParaRPr lang="es-CO" dirty="0">
+              <a:solidFill>
+                <a:schemeClr val="tx1">
+                  <a:lumMod val="85000"/>
+                  <a:lumOff val="15000"/>
+                </a:schemeClr>
+              </a:solidFill>
+            </a:endParaRPr>
           </a:p>
         </p:txBody>
       </p:sp>
@@ -16117,6 +16257,16 @@
           <a:prstGeom prst="rect">
             <a:avLst/>
           </a:prstGeom>
+          <a:ln>
+            <a:noFill/>
+          </a:ln>
+          <a:effectLst>
+            <a:outerShdw blurRad="292100" dist="139700" dir="2700000" algn="tl" rotWithShape="0">
+              <a:srgbClr val="333333">
+                <a:alpha val="65000"/>
+              </a:srgbClr>
+            </a:outerShdw>
+          </a:effectLst>
         </p:spPr>
       </p:pic>
       <p:pic>
@@ -16141,6 +16291,16 @@
           <a:prstGeom prst="rect">
             <a:avLst/>
           </a:prstGeom>
+          <a:ln>
+            <a:noFill/>
+          </a:ln>
+          <a:effectLst>
+            <a:outerShdw blurRad="292100" dist="139700" dir="2700000" algn="tl" rotWithShape="0">
+              <a:srgbClr val="333333">
+                <a:alpha val="65000"/>
+              </a:srgbClr>
+            </a:outerShdw>
+          </a:effectLst>
         </p:spPr>
       </p:pic>
       <p:sp>
@@ -16260,7 +16420,7 @@
     </a:clrScheme>
     <a:fontScheme name="Facet">
       <a:majorFont>
-        <a:latin typeface="Trebuchet MS" panose="020B0603020202020204"/>
+        <a:latin typeface="Trebuchet MS"/>
         <a:ea typeface=""/>
         <a:cs typeface=""/>
         <a:font script="Jpan" typeface="メイリオ"/>
@@ -16295,7 +16455,7 @@
         <a:font script="Geor" typeface="Sylfaen"/>
       </a:majorFont>
       <a:minorFont>
-        <a:latin typeface="Trebuchet MS" panose="020B0603020202020204"/>
+        <a:latin typeface="Trebuchet MS"/>
         <a:ea typeface=""/>
         <a:cs typeface=""/>
         <a:font script="Jpan" typeface="メイリオ"/>
@@ -16468,7 +16628,7 @@
   <a:extraClrSchemeLst/>
   <a:extLst>
     <a:ext uri="{05A4C25C-085E-4340-85A3-A5531E510DB2}">
-      <thm15:themeFamily xmlns:thm15="http://schemas.microsoft.com/office/thememl/2012/main" name="Facet" id="{C0C680CD-088A-49FC-A102-D699147F32B2}" vid="{CFBC31BA-B70F-4F30-BCAA-4F3011E16C4D}"/>
+      <thm15:themeFamily xmlns:thm15="http://schemas.microsoft.com/office/thememl/2012/main" xmlns="" name="Facet" id="{C0C680CD-088A-49FC-A102-D699147F32B2}" vid="{CFBC31BA-B70F-4F30-BCAA-4F3011E16C4D}"/>
     </a:ext>
   </a:extLst>
 </a:theme>

</xml_diff>

<commit_message>
Se sube cambios de la presentacion Se sube cambios en reportes
</commit_message>
<xml_diff>
--- a/extras/docs/rdc_presentacion.pptx
+++ b/extras/docs/rdc_presentacion.pptx
@@ -127,7 +127,7 @@
   </p:defaultTextStyle>
   <p:extLst>
     <p:ext uri="{EFAFB233-063F-42B5-8137-9DF3F51BA10A}">
-      <p15:sldGuideLst xmlns:p15="http://schemas.microsoft.com/office/powerpoint/2012/main" xmlns="">
+      <p15:sldGuideLst xmlns="" xmlns:p15="http://schemas.microsoft.com/office/powerpoint/2012/main">
         <p15:guide id="1" orient="horz" pos="2160">
           <p15:clr>
             <a:srgbClr val="A4A3A4"/>
@@ -480,11 +480,11 @@
         </c:dLbls>
         <c:gapWidth val="100"/>
         <c:overlap val="-24"/>
-        <c:axId val="147603840"/>
-        <c:axId val="147605760"/>
+        <c:axId val="153768320"/>
+        <c:axId val="153770240"/>
       </c:barChart>
       <c:catAx>
-        <c:axId val="147603840"/>
+        <c:axId val="153768320"/>
         <c:scaling>
           <c:orientation val="minMax"/>
         </c:scaling>
@@ -543,7 +543,7 @@
             <a:endParaRPr lang="es-CO"/>
           </a:p>
         </c:txPr>
-        <c:crossAx val="147605760"/>
+        <c:crossAx val="153770240"/>
         <c:crosses val="autoZero"/>
         <c:auto val="1"/>
         <c:lblAlgn val="ctr"/>
@@ -551,7 +551,7 @@
         <c:noMultiLvlLbl val="1"/>
       </c:catAx>
       <c:valAx>
-        <c:axId val="147605760"/>
+        <c:axId val="153770240"/>
         <c:scaling>
           <c:orientation val="minMax"/>
         </c:scaling>
@@ -618,7 +618,7 @@
             <a:endParaRPr lang="es-CO"/>
           </a:p>
         </c:txPr>
-        <c:crossAx val="147603840"/>
+        <c:crossAx val="153768320"/>
         <c:crosses val="autoZero"/>
         <c:crossBetween val="between"/>
       </c:valAx>
@@ -1023,11 +1023,11 @@
         </c:dLbls>
         <c:gapWidth val="100"/>
         <c:overlap val="-24"/>
-        <c:axId val="146809216"/>
-        <c:axId val="146811136"/>
+        <c:axId val="187703680"/>
+        <c:axId val="187705600"/>
       </c:barChart>
       <c:catAx>
-        <c:axId val="146809216"/>
+        <c:axId val="187703680"/>
         <c:scaling>
           <c:orientation val="minMax"/>
         </c:scaling>
@@ -1086,7 +1086,7 @@
             <a:endParaRPr lang="es-CO"/>
           </a:p>
         </c:txPr>
-        <c:crossAx val="146811136"/>
+        <c:crossAx val="187705600"/>
         <c:crosses val="autoZero"/>
         <c:auto val="1"/>
         <c:lblAlgn val="ctr"/>
@@ -1094,7 +1094,7 @@
         <c:noMultiLvlLbl val="1"/>
       </c:catAx>
       <c:valAx>
-        <c:axId val="146811136"/>
+        <c:axId val="187705600"/>
         <c:scaling>
           <c:orientation val="minMax"/>
         </c:scaling>
@@ -1161,7 +1161,7 @@
             <a:endParaRPr lang="es-CO"/>
           </a:p>
         </c:txPr>
-        <c:crossAx val="146809216"/>
+        <c:crossAx val="187703680"/>
         <c:crosses val="autoZero"/>
         <c:crossBetween val="between"/>
       </c:valAx>
@@ -7853,7 +7853,7 @@
           <p:cNvPr id="2" name="Marcador de contenido 1">
             <a:extLst>
               <a:ext uri="{FF2B5EF4-FFF2-40B4-BE49-F238E27FC236}">
-                <a16:creationId xmlns:a16="http://schemas.microsoft.com/office/drawing/2014/main" xmlns="" id="{BFB8CA3A-775A-4283-B473-CBA3C699E771}"/>
+                <a16:creationId xmlns="" xmlns:a16="http://schemas.microsoft.com/office/drawing/2014/main" id="{BFB8CA3A-775A-4283-B473-CBA3C699E771}"/>
               </a:ext>
             </a:extLst>
           </p:cNvPr>
@@ -7883,14 +7883,14 @@
                 <a:gridCol w="5304444">
                   <a:extLst>
                     <a:ext uri="{9D8B030D-6E8A-4147-A177-3AD203B41FA5}">
-                      <a16:colId xmlns:a16="http://schemas.microsoft.com/office/drawing/2014/main" xmlns="" val="2602485393"/>
+                      <a16:colId xmlns="" xmlns:a16="http://schemas.microsoft.com/office/drawing/2014/main" val="2602485393"/>
                     </a:ext>
                   </a:extLst>
                 </a:gridCol>
                 <a:gridCol w="1728977">
                   <a:extLst>
                     <a:ext uri="{9D8B030D-6E8A-4147-A177-3AD203B41FA5}">
-                      <a16:colId xmlns:a16="http://schemas.microsoft.com/office/drawing/2014/main" xmlns="" val="2786604418"/>
+                      <a16:colId xmlns="" xmlns:a16="http://schemas.microsoft.com/office/drawing/2014/main" val="2786604418"/>
                     </a:ext>
                   </a:extLst>
                 </a:gridCol>
@@ -7978,7 +7978,7 @@
                 </a:tc>
                 <a:extLst>
                   <a:ext uri="{0D108BD9-81ED-4DB2-BD59-A6C34878D82A}">
-                    <a16:rowId xmlns:a16="http://schemas.microsoft.com/office/drawing/2014/main" xmlns="" val="680232555"/>
+                    <a16:rowId xmlns="" xmlns:a16="http://schemas.microsoft.com/office/drawing/2014/main" val="680232555"/>
                   </a:ext>
                 </a:extLst>
               </a:tr>
@@ -8065,7 +8065,7 @@
                 </a:tc>
                 <a:extLst>
                   <a:ext uri="{0D108BD9-81ED-4DB2-BD59-A6C34878D82A}">
-                    <a16:rowId xmlns:a16="http://schemas.microsoft.com/office/drawing/2014/main" xmlns="" val="3577557739"/>
+                    <a16:rowId xmlns="" xmlns:a16="http://schemas.microsoft.com/office/drawing/2014/main" val="3577557739"/>
                   </a:ext>
                 </a:extLst>
               </a:tr>
@@ -8152,7 +8152,7 @@
                 </a:tc>
                 <a:extLst>
                   <a:ext uri="{0D108BD9-81ED-4DB2-BD59-A6C34878D82A}">
-                    <a16:rowId xmlns:a16="http://schemas.microsoft.com/office/drawing/2014/main" xmlns="" val="3154357346"/>
+                    <a16:rowId xmlns="" xmlns:a16="http://schemas.microsoft.com/office/drawing/2014/main" val="3154357346"/>
                   </a:ext>
                 </a:extLst>
               </a:tr>
@@ -8239,7 +8239,7 @@
                 </a:tc>
                 <a:extLst>
                   <a:ext uri="{0D108BD9-81ED-4DB2-BD59-A6C34878D82A}">
-                    <a16:rowId xmlns:a16="http://schemas.microsoft.com/office/drawing/2014/main" xmlns="" val="2015189163"/>
+                    <a16:rowId xmlns="" xmlns:a16="http://schemas.microsoft.com/office/drawing/2014/main" val="2015189163"/>
                   </a:ext>
                 </a:extLst>
               </a:tr>
@@ -8326,7 +8326,7 @@
                 </a:tc>
                 <a:extLst>
                   <a:ext uri="{0D108BD9-81ED-4DB2-BD59-A6C34878D82A}">
-                    <a16:rowId xmlns:a16="http://schemas.microsoft.com/office/drawing/2014/main" xmlns="" val="3033574485"/>
+                    <a16:rowId xmlns="" xmlns:a16="http://schemas.microsoft.com/office/drawing/2014/main" val="3033574485"/>
                   </a:ext>
                 </a:extLst>
               </a:tr>
@@ -8413,7 +8413,7 @@
                 </a:tc>
                 <a:extLst>
                   <a:ext uri="{0D108BD9-81ED-4DB2-BD59-A6C34878D82A}">
-                    <a16:rowId xmlns:a16="http://schemas.microsoft.com/office/drawing/2014/main" xmlns="" val="105546820"/>
+                    <a16:rowId xmlns="" xmlns:a16="http://schemas.microsoft.com/office/drawing/2014/main" val="105546820"/>
                   </a:ext>
                 </a:extLst>
               </a:tr>
@@ -8500,7 +8500,7 @@
                 </a:tc>
                 <a:extLst>
                   <a:ext uri="{0D108BD9-81ED-4DB2-BD59-A6C34878D82A}">
-                    <a16:rowId xmlns:a16="http://schemas.microsoft.com/office/drawing/2014/main" xmlns="" val="1824869552"/>
+                    <a16:rowId xmlns="" xmlns:a16="http://schemas.microsoft.com/office/drawing/2014/main" val="1824869552"/>
                   </a:ext>
                 </a:extLst>
               </a:tr>
@@ -8587,7 +8587,7 @@
                 </a:tc>
                 <a:extLst>
                   <a:ext uri="{0D108BD9-81ED-4DB2-BD59-A6C34878D82A}">
-                    <a16:rowId xmlns:a16="http://schemas.microsoft.com/office/drawing/2014/main" xmlns="" val="3109995033"/>
+                    <a16:rowId xmlns="" xmlns:a16="http://schemas.microsoft.com/office/drawing/2014/main" val="3109995033"/>
                   </a:ext>
                 </a:extLst>
               </a:tr>
@@ -8674,7 +8674,7 @@
                 </a:tc>
                 <a:extLst>
                   <a:ext uri="{0D108BD9-81ED-4DB2-BD59-A6C34878D82A}">
-                    <a16:rowId xmlns:a16="http://schemas.microsoft.com/office/drawing/2014/main" xmlns="" val="3267673382"/>
+                    <a16:rowId xmlns="" xmlns:a16="http://schemas.microsoft.com/office/drawing/2014/main" val="3267673382"/>
                   </a:ext>
                 </a:extLst>
               </a:tr>
@@ -8761,7 +8761,7 @@
                 </a:tc>
                 <a:extLst>
                   <a:ext uri="{0D108BD9-81ED-4DB2-BD59-A6C34878D82A}">
-                    <a16:rowId xmlns:a16="http://schemas.microsoft.com/office/drawing/2014/main" xmlns="" val="1788793914"/>
+                    <a16:rowId xmlns="" xmlns:a16="http://schemas.microsoft.com/office/drawing/2014/main" val="1788793914"/>
                   </a:ext>
                 </a:extLst>
               </a:tr>
@@ -8848,7 +8848,7 @@
                 </a:tc>
                 <a:extLst>
                   <a:ext uri="{0D108BD9-81ED-4DB2-BD59-A6C34878D82A}">
-                    <a16:rowId xmlns:a16="http://schemas.microsoft.com/office/drawing/2014/main" xmlns="" val="758896334"/>
+                    <a16:rowId xmlns="" xmlns:a16="http://schemas.microsoft.com/office/drawing/2014/main" val="758896334"/>
                   </a:ext>
                 </a:extLst>
               </a:tr>
@@ -8935,7 +8935,7 @@
                 </a:tc>
                 <a:extLst>
                   <a:ext uri="{0D108BD9-81ED-4DB2-BD59-A6C34878D82A}">
-                    <a16:rowId xmlns:a16="http://schemas.microsoft.com/office/drawing/2014/main" xmlns="" val="2965732642"/>
+                    <a16:rowId xmlns="" xmlns:a16="http://schemas.microsoft.com/office/drawing/2014/main" val="2965732642"/>
                   </a:ext>
                 </a:extLst>
               </a:tr>
@@ -9022,7 +9022,7 @@
                 </a:tc>
                 <a:extLst>
                   <a:ext uri="{0D108BD9-81ED-4DB2-BD59-A6C34878D82A}">
-                    <a16:rowId xmlns:a16="http://schemas.microsoft.com/office/drawing/2014/main" xmlns="" val="456296594"/>
+                    <a16:rowId xmlns="" xmlns:a16="http://schemas.microsoft.com/office/drawing/2014/main" val="456296594"/>
                   </a:ext>
                 </a:extLst>
               </a:tr>
@@ -9109,7 +9109,7 @@
                 </a:tc>
                 <a:extLst>
                   <a:ext uri="{0D108BD9-81ED-4DB2-BD59-A6C34878D82A}">
-                    <a16:rowId xmlns:a16="http://schemas.microsoft.com/office/drawing/2014/main" xmlns="" val="1809744462"/>
+                    <a16:rowId xmlns="" xmlns:a16="http://schemas.microsoft.com/office/drawing/2014/main" val="1809744462"/>
                   </a:ext>
                 </a:extLst>
               </a:tr>
@@ -9196,7 +9196,7 @@
                 </a:tc>
                 <a:extLst>
                   <a:ext uri="{0D108BD9-81ED-4DB2-BD59-A6C34878D82A}">
-                    <a16:rowId xmlns:a16="http://schemas.microsoft.com/office/drawing/2014/main" xmlns="" val="3437766592"/>
+                    <a16:rowId xmlns="" xmlns:a16="http://schemas.microsoft.com/office/drawing/2014/main" val="3437766592"/>
                   </a:ext>
                 </a:extLst>
               </a:tr>
@@ -9361,7 +9361,7 @@
           <p:cNvPr id="6" name="Marcador de contenido 5">
             <a:extLst>
               <a:ext uri="{FF2B5EF4-FFF2-40B4-BE49-F238E27FC236}">
-                <a16:creationId xmlns:a16="http://schemas.microsoft.com/office/drawing/2014/main" xmlns="" id="{33CC28FB-25F0-4849-B092-1742F3204970}"/>
+                <a16:creationId xmlns="" xmlns:a16="http://schemas.microsoft.com/office/drawing/2014/main" id="{33CC28FB-25F0-4849-B092-1742F3204970}"/>
               </a:ext>
             </a:extLst>
           </p:cNvPr>
@@ -9391,42 +9391,42 @@
                 <a:gridCol w="1224043">
                   <a:extLst>
                     <a:ext uri="{9D8B030D-6E8A-4147-A177-3AD203B41FA5}">
-                      <a16:colId xmlns:a16="http://schemas.microsoft.com/office/drawing/2014/main" xmlns="" val="1021433285"/>
+                      <a16:colId xmlns="" xmlns:a16="http://schemas.microsoft.com/office/drawing/2014/main" val="1021433285"/>
                     </a:ext>
                   </a:extLst>
                 </a:gridCol>
                 <a:gridCol w="937437">
                   <a:extLst>
                     <a:ext uri="{9D8B030D-6E8A-4147-A177-3AD203B41FA5}">
-                      <a16:colId xmlns:a16="http://schemas.microsoft.com/office/drawing/2014/main" xmlns="" val="1809417385"/>
+                      <a16:colId xmlns="" xmlns:a16="http://schemas.microsoft.com/office/drawing/2014/main" val="1809417385"/>
                     </a:ext>
                   </a:extLst>
                 </a:gridCol>
                 <a:gridCol w="937437">
                   <a:extLst>
                     <a:ext uri="{9D8B030D-6E8A-4147-A177-3AD203B41FA5}">
-                      <a16:colId xmlns:a16="http://schemas.microsoft.com/office/drawing/2014/main" xmlns="" val="1689638878"/>
+                      <a16:colId xmlns="" xmlns:a16="http://schemas.microsoft.com/office/drawing/2014/main" val="1689638878"/>
                     </a:ext>
                   </a:extLst>
                 </a:gridCol>
                 <a:gridCol w="937437">
                   <a:extLst>
                     <a:ext uri="{9D8B030D-6E8A-4147-A177-3AD203B41FA5}">
-                      <a16:colId xmlns:a16="http://schemas.microsoft.com/office/drawing/2014/main" xmlns="" val="2762686330"/>
+                      <a16:colId xmlns="" xmlns:a16="http://schemas.microsoft.com/office/drawing/2014/main" val="2762686330"/>
                     </a:ext>
                   </a:extLst>
                 </a:gridCol>
                 <a:gridCol w="818278">
                   <a:extLst>
                     <a:ext uri="{9D8B030D-6E8A-4147-A177-3AD203B41FA5}">
-                      <a16:colId xmlns:a16="http://schemas.microsoft.com/office/drawing/2014/main" xmlns="" val="2113957765"/>
+                      <a16:colId xmlns="" xmlns:a16="http://schemas.microsoft.com/office/drawing/2014/main" val="2113957765"/>
                     </a:ext>
                   </a:extLst>
                 </a:gridCol>
                 <a:gridCol w="999168">
                   <a:extLst>
                     <a:ext uri="{9D8B030D-6E8A-4147-A177-3AD203B41FA5}">
-                      <a16:colId xmlns:a16="http://schemas.microsoft.com/office/drawing/2014/main" xmlns="" val="2495045676"/>
+                      <a16:colId xmlns="" xmlns:a16="http://schemas.microsoft.com/office/drawing/2014/main" val="2495045676"/>
                     </a:ext>
                   </a:extLst>
                 </a:gridCol>
@@ -9676,7 +9676,7 @@
                 </a:tc>
                 <a:extLst>
                   <a:ext uri="{0D108BD9-81ED-4DB2-BD59-A6C34878D82A}">
-                    <a16:rowId xmlns:a16="http://schemas.microsoft.com/office/drawing/2014/main" xmlns="" val="1205791969"/>
+                    <a16:rowId xmlns="" xmlns:a16="http://schemas.microsoft.com/office/drawing/2014/main" val="1205791969"/>
                   </a:ext>
                 </a:extLst>
               </a:tr>
@@ -9970,7 +9970,7 @@
                 </a:tc>
                 <a:extLst>
                   <a:ext uri="{0D108BD9-81ED-4DB2-BD59-A6C34878D82A}">
-                    <a16:rowId xmlns:a16="http://schemas.microsoft.com/office/drawing/2014/main" xmlns="" val="3190319937"/>
+                    <a16:rowId xmlns="" xmlns:a16="http://schemas.microsoft.com/office/drawing/2014/main" val="3190319937"/>
                   </a:ext>
                 </a:extLst>
               </a:tr>
@@ -10365,7 +10365,7 @@
                 </a:tc>
                 <a:extLst>
                   <a:ext uri="{0D108BD9-81ED-4DB2-BD59-A6C34878D82A}">
-                    <a16:rowId xmlns:a16="http://schemas.microsoft.com/office/drawing/2014/main" xmlns="" val="3057983255"/>
+                    <a16:rowId xmlns="" xmlns:a16="http://schemas.microsoft.com/office/drawing/2014/main" val="3057983255"/>
                   </a:ext>
                 </a:extLst>
               </a:tr>
@@ -10695,7 +10695,7 @@
                 </a:tc>
                 <a:extLst>
                   <a:ext uri="{0D108BD9-81ED-4DB2-BD59-A6C34878D82A}">
-                    <a16:rowId xmlns:a16="http://schemas.microsoft.com/office/drawing/2014/main" xmlns="" val="142723232"/>
+                    <a16:rowId xmlns="" xmlns:a16="http://schemas.microsoft.com/office/drawing/2014/main" val="142723232"/>
                   </a:ext>
                 </a:extLst>
               </a:tr>
@@ -11025,7 +11025,7 @@
                 </a:tc>
                 <a:extLst>
                   <a:ext uri="{0D108BD9-81ED-4DB2-BD59-A6C34878D82A}">
-                    <a16:rowId xmlns:a16="http://schemas.microsoft.com/office/drawing/2014/main" xmlns="" val="2010654794"/>
+                    <a16:rowId xmlns="" xmlns:a16="http://schemas.microsoft.com/office/drawing/2014/main" val="2010654794"/>
                   </a:ext>
                 </a:extLst>
               </a:tr>
@@ -11365,7 +11365,7 @@
                 </a:tc>
                 <a:extLst>
                   <a:ext uri="{0D108BD9-81ED-4DB2-BD59-A6C34878D82A}">
-                    <a16:rowId xmlns:a16="http://schemas.microsoft.com/office/drawing/2014/main" xmlns="" val="3090693922"/>
+                    <a16:rowId xmlns="" xmlns:a16="http://schemas.microsoft.com/office/drawing/2014/main" val="3090693922"/>
                   </a:ext>
                 </a:extLst>
               </a:tr>
@@ -11760,7 +11760,7 @@
                 </a:tc>
                 <a:extLst>
                   <a:ext uri="{0D108BD9-81ED-4DB2-BD59-A6C34878D82A}">
-                    <a16:rowId xmlns:a16="http://schemas.microsoft.com/office/drawing/2014/main" xmlns="" val="627599904"/>
+                    <a16:rowId xmlns="" xmlns:a16="http://schemas.microsoft.com/office/drawing/2014/main" val="627599904"/>
                   </a:ext>
                 </a:extLst>
               </a:tr>
@@ -12090,7 +12090,7 @@
                 </a:tc>
                 <a:extLst>
                   <a:ext uri="{0D108BD9-81ED-4DB2-BD59-A6C34878D82A}">
-                    <a16:rowId xmlns:a16="http://schemas.microsoft.com/office/drawing/2014/main" xmlns="" val="2241206887"/>
+                    <a16:rowId xmlns="" xmlns:a16="http://schemas.microsoft.com/office/drawing/2014/main" val="2241206887"/>
                   </a:ext>
                 </a:extLst>
               </a:tr>
@@ -12420,7 +12420,7 @@
                 </a:tc>
                 <a:extLst>
                   <a:ext uri="{0D108BD9-81ED-4DB2-BD59-A6C34878D82A}">
-                    <a16:rowId xmlns:a16="http://schemas.microsoft.com/office/drawing/2014/main" xmlns="" val="552371880"/>
+                    <a16:rowId xmlns="" xmlns:a16="http://schemas.microsoft.com/office/drawing/2014/main" val="552371880"/>
                   </a:ext>
                 </a:extLst>
               </a:tr>
@@ -12750,7 +12750,7 @@
                 </a:tc>
                 <a:extLst>
                   <a:ext uri="{0D108BD9-81ED-4DB2-BD59-A6C34878D82A}">
-                    <a16:rowId xmlns:a16="http://schemas.microsoft.com/office/drawing/2014/main" xmlns="" val="116541910"/>
+                    <a16:rowId xmlns="" xmlns:a16="http://schemas.microsoft.com/office/drawing/2014/main" val="116541910"/>
                   </a:ext>
                 </a:extLst>
               </a:tr>
@@ -13080,7 +13080,7 @@
                 </a:tc>
                 <a:extLst>
                   <a:ext uri="{0D108BD9-81ED-4DB2-BD59-A6C34878D82A}">
-                    <a16:rowId xmlns:a16="http://schemas.microsoft.com/office/drawing/2014/main" xmlns="" val="1742673978"/>
+                    <a16:rowId xmlns="" xmlns:a16="http://schemas.microsoft.com/office/drawing/2014/main" val="1742673978"/>
                   </a:ext>
                 </a:extLst>
               </a:tr>
@@ -13420,7 +13420,7 @@
                 </a:tc>
                 <a:extLst>
                   <a:ext uri="{0D108BD9-81ED-4DB2-BD59-A6C34878D82A}">
-                    <a16:rowId xmlns:a16="http://schemas.microsoft.com/office/drawing/2014/main" xmlns="" val="722975958"/>
+                    <a16:rowId xmlns="" xmlns:a16="http://schemas.microsoft.com/office/drawing/2014/main" val="722975958"/>
                   </a:ext>
                 </a:extLst>
               </a:tr>
@@ -13805,7 +13805,7 @@
                 </a:tc>
                 <a:extLst>
                   <a:ext uri="{0D108BD9-81ED-4DB2-BD59-A6C34878D82A}">
-                    <a16:rowId xmlns:a16="http://schemas.microsoft.com/office/drawing/2014/main" xmlns="" val="2653783117"/>
+                    <a16:rowId xmlns="" xmlns:a16="http://schemas.microsoft.com/office/drawing/2014/main" val="2653783117"/>
                   </a:ext>
                 </a:extLst>
               </a:tr>
@@ -13909,7 +13909,7 @@
           <p:cNvPr id="8" name="Chart 1" title="Chart">
             <a:extLst>
               <a:ext uri="{FF2B5EF4-FFF2-40B4-BE49-F238E27FC236}">
-                <a16:creationId xmlns:a16="http://schemas.microsoft.com/office/drawing/2014/main" xmlns="" id="{00000000-0008-0000-0000-000003000000}"/>
+                <a16:creationId xmlns="" xmlns:a16="http://schemas.microsoft.com/office/drawing/2014/main" id="{00000000-0008-0000-0000-000003000000}"/>
               </a:ext>
             </a:extLst>
           </p:cNvPr>
@@ -13939,7 +13939,7 @@
           <p:cNvPr id="9" name="Chart 1" title="Chart">
             <a:extLst>
               <a:ext uri="{FF2B5EF4-FFF2-40B4-BE49-F238E27FC236}">
-                <a16:creationId xmlns:a16="http://schemas.microsoft.com/office/drawing/2014/main" xmlns="" id="{00000000-0008-0000-0000-000002000000}"/>
+                <a16:creationId xmlns="" xmlns:a16="http://schemas.microsoft.com/office/drawing/2014/main" id="{00000000-0008-0000-0000-000002000000}"/>
               </a:ext>
             </a:extLst>
           </p:cNvPr>
@@ -14060,7 +14060,7 @@
           <p:cNvPr id="3" name="CuadroTexto 2">
             <a:extLst>
               <a:ext uri="{FF2B5EF4-FFF2-40B4-BE49-F238E27FC236}">
-                <a16:creationId xmlns:a16="http://schemas.microsoft.com/office/drawing/2014/main" xmlns="" id="{EB5CEF16-DF68-4175-87A1-37A37A1E0664}"/>
+                <a16:creationId xmlns="" xmlns:a16="http://schemas.microsoft.com/office/drawing/2014/main" id="{EB5CEF16-DF68-4175-87A1-37A37A1E0664}"/>
               </a:ext>
             </a:extLst>
           </p:cNvPr>
@@ -14395,7 +14395,7 @@
           <p:cNvPr id="3" name="CuadroTexto 2">
             <a:extLst>
               <a:ext uri="{FF2B5EF4-FFF2-40B4-BE49-F238E27FC236}">
-                <a16:creationId xmlns:a16="http://schemas.microsoft.com/office/drawing/2014/main" xmlns="" id="{B3E05B2C-448F-4ECF-BEF8-9F8192CC5623}"/>
+                <a16:creationId xmlns="" xmlns:a16="http://schemas.microsoft.com/office/drawing/2014/main" id="{B3E05B2C-448F-4ECF-BEF8-9F8192CC5623}"/>
               </a:ext>
             </a:extLst>
           </p:cNvPr>
@@ -14601,7 +14601,7 @@
           <p:cNvPr id="2" name="CuadroTexto 1">
             <a:extLst>
               <a:ext uri="{FF2B5EF4-FFF2-40B4-BE49-F238E27FC236}">
-                <a16:creationId xmlns:a16="http://schemas.microsoft.com/office/drawing/2014/main" xmlns="" id="{585F2FF1-E103-438A-A5E2-394CD4C49ABE}"/>
+                <a16:creationId xmlns="" xmlns:a16="http://schemas.microsoft.com/office/drawing/2014/main" id="{585F2FF1-E103-438A-A5E2-394CD4C49ABE}"/>
               </a:ext>
             </a:extLst>
           </p:cNvPr>
@@ -14947,7 +14947,7 @@
           <p:cNvPr id="2" name="CuadroTexto 1">
             <a:extLst>
               <a:ext uri="{FF2B5EF4-FFF2-40B4-BE49-F238E27FC236}">
-                <a16:creationId xmlns:a16="http://schemas.microsoft.com/office/drawing/2014/main" xmlns="" id="{4C0880D7-B166-4F0F-ACAC-974216E18C56}"/>
+                <a16:creationId xmlns="" xmlns:a16="http://schemas.microsoft.com/office/drawing/2014/main" id="{4C0880D7-B166-4F0F-ACAC-974216E18C56}"/>
               </a:ext>
             </a:extLst>
           </p:cNvPr>
@@ -15306,8 +15306,8 @@
         </p:nvSpPr>
         <p:spPr>
           <a:xfrm>
-            <a:off x="202449" y="1891334"/>
-            <a:ext cx="7829078" cy="4247317"/>
+            <a:off x="748145" y="1766643"/>
+            <a:ext cx="7283382" cy="4524315"/>
           </a:xfrm>
           <a:prstGeom prst="rect">
             <a:avLst/>
@@ -15319,10 +15319,7 @@
           </a:bodyPr>
           <a:lstStyle/>
           <a:p>
-            <a:pPr marL="285750" indent="-285750" algn="just">
-              <a:buFont typeface="Arial" panose="020B0604020202020204" pitchFamily="34" charset="0"/>
-              <a:buChar char="•"/>
-            </a:pPr>
+            <a:pPr algn="just"/>
             <a:r>
               <a:rPr lang="es-CO" dirty="0">
                 <a:solidFill>
@@ -15358,10 +15355,7 @@
             </a:endParaRPr>
           </a:p>
           <a:p>
-            <a:pPr marL="285750" indent="-285750" algn="just">
-              <a:buFont typeface="Arial" panose="020B0604020202020204" pitchFamily="34" charset="0"/>
-              <a:buChar char="•"/>
-            </a:pPr>
+            <a:pPr algn="just"/>
             <a:r>
               <a:rPr lang="es-CO" dirty="0">
                 <a:solidFill>
@@ -15400,10 +15394,7 @@
             </a:endParaRPr>
           </a:p>
           <a:p>
-            <a:pPr marL="285750" indent="-285750" algn="just">
-              <a:buFont typeface="Arial" panose="020B0604020202020204" pitchFamily="34" charset="0"/>
-              <a:buChar char="•"/>
-            </a:pPr>
+            <a:pPr algn="just"/>
             <a:r>
               <a:rPr lang="es-CO" dirty="0">
                 <a:solidFill>
@@ -15435,8 +15426,27 @@
                   </a:schemeClr>
                 </a:solidFill>
               </a:rPr>
-              <a:t>docentes que desconocen que el formato contiene funciones agregadas para mantener un mínimo control y dar un poco de ayuda durante el completado.</a:t>
-            </a:r>
+              <a:t>docentes que desconocen que el formato contiene funciones agregadas para mantener un mínimo control y dar un poco de ayuda </a:t>
+            </a:r>
+            <a:r>
+              <a:rPr lang="es-CO" dirty="0" smtClean="0">
+                <a:solidFill>
+                  <a:schemeClr val="tx1">
+                    <a:lumMod val="85000"/>
+                    <a:lumOff val="15000"/>
+                  </a:schemeClr>
+                </a:solidFill>
+              </a:rPr>
+              <a:t>al proceso.</a:t>
+            </a:r>
+            <a:endParaRPr lang="es-CO" dirty="0">
+              <a:solidFill>
+                <a:schemeClr val="tx1">
+                  <a:lumMod val="85000"/>
+                  <a:lumOff val="15000"/>
+                </a:schemeClr>
+              </a:solidFill>
+            </a:endParaRPr>
           </a:p>
           <a:p>
             <a:pPr algn="ctr"/>
@@ -15572,7 +15582,7 @@
           <p:cNvPr id="2" name="CuadroTexto 1">
             <a:extLst>
               <a:ext uri="{FF2B5EF4-FFF2-40B4-BE49-F238E27FC236}">
-                <a16:creationId xmlns:a16="http://schemas.microsoft.com/office/drawing/2014/main" xmlns="" id="{4C0880D7-B166-4F0F-ACAC-974216E18C56}"/>
+                <a16:creationId xmlns="" xmlns:a16="http://schemas.microsoft.com/office/drawing/2014/main" id="{4C0880D7-B166-4F0F-ACAC-974216E18C56}"/>
               </a:ext>
             </a:extLst>
           </p:cNvPr>
@@ -15888,7 +15898,7 @@
           <p:cNvPr id="2" name="CuadroTexto 1">
             <a:extLst>
               <a:ext uri="{FF2B5EF4-FFF2-40B4-BE49-F238E27FC236}">
-                <a16:creationId xmlns:a16="http://schemas.microsoft.com/office/drawing/2014/main" xmlns="" id="{4C0880D7-B166-4F0F-ACAC-974216E18C56}"/>
+                <a16:creationId xmlns="" xmlns:a16="http://schemas.microsoft.com/office/drawing/2014/main" id="{4C0880D7-B166-4F0F-ACAC-974216E18C56}"/>
               </a:ext>
             </a:extLst>
           </p:cNvPr>
@@ -16739,7 +16749,7 @@
           <p:cNvPr id="5" name="Imagen 4">
             <a:extLst>
               <a:ext uri="{FF2B5EF4-FFF2-40B4-BE49-F238E27FC236}">
-                <a16:creationId xmlns:a16="http://schemas.microsoft.com/office/drawing/2014/main" xmlns="" id="{B3AF45A2-0048-4680-9268-7058CCBF71DF}"/>
+                <a16:creationId xmlns="" xmlns:a16="http://schemas.microsoft.com/office/drawing/2014/main" id="{B3AF45A2-0048-4680-9268-7058CCBF71DF}"/>
               </a:ext>
             </a:extLst>
           </p:cNvPr>
@@ -16775,7 +16785,7 @@
           <p:cNvPr id="7" name="Imagen 6">
             <a:extLst>
               <a:ext uri="{FF2B5EF4-FFF2-40B4-BE49-F238E27FC236}">
-                <a16:creationId xmlns:a16="http://schemas.microsoft.com/office/drawing/2014/main" xmlns="" id="{2C013981-C90B-4026-A12B-5D60518F9D30}"/>
+                <a16:creationId xmlns="" xmlns:a16="http://schemas.microsoft.com/office/drawing/2014/main" id="{2C013981-C90B-4026-A12B-5D60518F9D30}"/>
               </a:ext>
             </a:extLst>
           </p:cNvPr>
@@ -16811,7 +16821,7 @@
           <p:cNvPr id="9" name="Imagen 8">
             <a:extLst>
               <a:ext uri="{FF2B5EF4-FFF2-40B4-BE49-F238E27FC236}">
-                <a16:creationId xmlns:a16="http://schemas.microsoft.com/office/drawing/2014/main" xmlns="" id="{AAA72AB6-D7ED-4441-88E9-CE75A79FDCA8}"/>
+                <a16:creationId xmlns="" xmlns:a16="http://schemas.microsoft.com/office/drawing/2014/main" id="{AAA72AB6-D7ED-4441-88E9-CE75A79FDCA8}"/>
               </a:ext>
             </a:extLst>
           </p:cNvPr>
@@ -16847,7 +16857,7 @@
           <p:cNvPr id="11" name="Imagen 10">
             <a:extLst>
               <a:ext uri="{FF2B5EF4-FFF2-40B4-BE49-F238E27FC236}">
-                <a16:creationId xmlns:a16="http://schemas.microsoft.com/office/drawing/2014/main" xmlns="" id="{B84EE28F-8E12-4ABE-8662-DBA26E891732}"/>
+                <a16:creationId xmlns="" xmlns:a16="http://schemas.microsoft.com/office/drawing/2014/main" id="{B84EE28F-8E12-4ABE-8662-DBA26E891732}"/>
               </a:ext>
             </a:extLst>
           </p:cNvPr>
@@ -16974,7 +16984,7 @@
           <p:cNvPr id="4" name="Imagen 3">
             <a:extLst>
               <a:ext uri="{FF2B5EF4-FFF2-40B4-BE49-F238E27FC236}">
-                <a16:creationId xmlns:a16="http://schemas.microsoft.com/office/drawing/2014/main" xmlns="" id="{16D90900-6598-4986-AE8B-5DE9E3CE52D9}"/>
+                <a16:creationId xmlns="" xmlns:a16="http://schemas.microsoft.com/office/drawing/2014/main" id="{16D90900-6598-4986-AE8B-5DE9E3CE52D9}"/>
               </a:ext>
             </a:extLst>
           </p:cNvPr>
@@ -17439,7 +17449,29 @@
                   </a:schemeClr>
                 </a:solidFill>
               </a:rPr>
-              <a:t>En este modulo se ingresan los docentes, las semanas del semestre, la asignación a cada docente y evaluar cada docente.</a:t>
+              <a:t>En este modulo se </a:t>
+            </a:r>
+            <a:r>
+              <a:rPr lang="es-CO" dirty="0" smtClean="0">
+                <a:solidFill>
+                  <a:schemeClr val="tx1">
+                    <a:lumMod val="85000"/>
+                    <a:lumOff val="15000"/>
+                  </a:schemeClr>
+                </a:solidFill>
+              </a:rPr>
+              <a:t>gestionan los </a:t>
+            </a:r>
+            <a:r>
+              <a:rPr lang="es-CO" dirty="0">
+                <a:solidFill>
+                  <a:schemeClr val="tx1">
+                    <a:lumMod val="85000"/>
+                    <a:lumOff val="15000"/>
+                  </a:schemeClr>
+                </a:solidFill>
+              </a:rPr>
+              <a:t>docentes, las semanas del semestre, la asignación a cada docente y evaluar cada docente.</a:t>
             </a:r>
           </a:p>
         </p:txBody>
@@ -17610,7 +17642,7 @@
           <p:cNvPr id="3" name="CuadroTexto 2">
             <a:extLst>
               <a:ext uri="{FF2B5EF4-FFF2-40B4-BE49-F238E27FC236}">
-                <a16:creationId xmlns:a16="http://schemas.microsoft.com/office/drawing/2014/main" xmlns="" id="{E9CC970F-E4E6-47B4-894B-BB9D00F1CF33}"/>
+                <a16:creationId xmlns="" xmlns:a16="http://schemas.microsoft.com/office/drawing/2014/main" id="{E9CC970F-E4E6-47B4-894B-BB9D00F1CF33}"/>
               </a:ext>
             </a:extLst>
           </p:cNvPr>
@@ -17709,8 +17741,27 @@
                   </a:schemeClr>
                 </a:solidFill>
               </a:rPr>
-              <a:t>Registro de Actividades y Productos</a:t>
-            </a:r>
+              <a:t>Registro de </a:t>
+            </a:r>
+            <a:r>
+              <a:rPr lang="es-CO" dirty="0" smtClean="0">
+                <a:solidFill>
+                  <a:schemeClr val="tx1">
+                    <a:lumMod val="85000"/>
+                    <a:lumOff val="15000"/>
+                  </a:schemeClr>
+                </a:solidFill>
+              </a:rPr>
+              <a:t>Actividades</a:t>
+            </a:r>
+            <a:endParaRPr lang="es-CO" dirty="0">
+              <a:solidFill>
+                <a:schemeClr val="tx1">
+                  <a:lumMod val="85000"/>
+                  <a:lumOff val="15000"/>
+                </a:schemeClr>
+              </a:solidFill>
+            </a:endParaRPr>
           </a:p>
         </p:txBody>
       </p:sp>
@@ -18105,7 +18156,29 @@
                   </a:schemeClr>
                 </a:solidFill>
               </a:rPr>
-              <a:t>Registro de Actividades y Productos</a:t>
+              <a:t>Visualización </a:t>
+            </a:r>
+            <a:r>
+              <a:rPr lang="es-CO" dirty="0" smtClean="0">
+                <a:solidFill>
+                  <a:schemeClr val="tx1">
+                    <a:lumMod val="85000"/>
+                    <a:lumOff val="15000"/>
+                  </a:schemeClr>
+                </a:solidFill>
+              </a:rPr>
+              <a:t>de </a:t>
+            </a:r>
+            <a:r>
+              <a:rPr lang="es-CO" dirty="0" smtClean="0">
+                <a:solidFill>
+                  <a:schemeClr val="tx1">
+                    <a:lumMod val="85000"/>
+                    <a:lumOff val="15000"/>
+                  </a:schemeClr>
+                </a:solidFill>
+              </a:rPr>
+              <a:t>Productos</a:t>
             </a:r>
             <a:endParaRPr lang="es-CO" dirty="0">
               <a:solidFill>
@@ -18382,7 +18455,7 @@
   <a:extraClrSchemeLst/>
   <a:extLst>
     <a:ext uri="{05A4C25C-085E-4340-85A3-A5531E510DB2}">
-      <thm15:themeFamily xmlns:thm15="http://schemas.microsoft.com/office/thememl/2012/main" xmlns="" name="Facet" id="{C0C680CD-088A-49FC-A102-D699147F32B2}" vid="{CFBC31BA-B70F-4F30-BCAA-4F3011E16C4D}"/>
+      <thm15:themeFamily xmlns="" xmlns:thm15="http://schemas.microsoft.com/office/thememl/2012/main" name="Facet" id="{C0C680CD-088A-49FC-A102-D699147F32B2}" vid="{CFBC31BA-B70F-4F30-BCAA-4F3011E16C4D}"/>
     </a:ext>
   </a:extLst>
 </a:theme>

</xml_diff>